<commit_message>
updated presentation for SHAP
</commit_message>
<xml_diff>
--- a/2_feature_importance/feature_importance.pptx
+++ b/2_feature_importance/feature_importance.pptx
@@ -15,18 +15,26 @@
     <p:sldId id="260" r:id="rId9"/>
     <p:sldId id="271" r:id="rId10"/>
     <p:sldId id="262" r:id="rId11"/>
-    <p:sldId id="264" r:id="rId12"/>
-    <p:sldId id="272" r:id="rId13"/>
-    <p:sldId id="273" r:id="rId14"/>
-    <p:sldId id="274" r:id="rId15"/>
-    <p:sldId id="263" r:id="rId16"/>
-    <p:sldId id="265" r:id="rId17"/>
-    <p:sldId id="266" r:id="rId18"/>
-    <p:sldId id="267" r:id="rId19"/>
-    <p:sldId id="268" r:id="rId20"/>
-    <p:sldId id="275" r:id="rId21"/>
-    <p:sldId id="276" r:id="rId22"/>
-    <p:sldId id="277" r:id="rId23"/>
+    <p:sldId id="263" r:id="rId12"/>
+    <p:sldId id="264" r:id="rId13"/>
+    <p:sldId id="272" r:id="rId14"/>
+    <p:sldId id="273" r:id="rId15"/>
+    <p:sldId id="274" r:id="rId16"/>
+    <p:sldId id="280" r:id="rId17"/>
+    <p:sldId id="279" r:id="rId18"/>
+    <p:sldId id="265" r:id="rId19"/>
+    <p:sldId id="278" r:id="rId20"/>
+    <p:sldId id="281" r:id="rId21"/>
+    <p:sldId id="282" r:id="rId22"/>
+    <p:sldId id="285" r:id="rId23"/>
+    <p:sldId id="284" r:id="rId24"/>
+    <p:sldId id="283" r:id="rId25"/>
+    <p:sldId id="266" r:id="rId26"/>
+    <p:sldId id="267" r:id="rId27"/>
+    <p:sldId id="268" r:id="rId28"/>
+    <p:sldId id="275" r:id="rId29"/>
+    <p:sldId id="276" r:id="rId30"/>
+    <p:sldId id="277" r:id="rId31"/>
   </p:sldIdLst>
   <p:sldSz cx="12192000" cy="6858000"/>
   <p:notesSz cx="6858000" cy="9144000"/>
@@ -2687,7 +2695,7 @@
           <a:p>
             <a:fld id="{73DB11D8-BF27-47D9-AF2D-8BA02D876EFC}" type="datetimeFigureOut">
               <a:rPr lang="en-US" smtClean="0"/>
-              <a:t>3/25/2024</a:t>
+              <a:t>3/26/2024</a:t>
             </a:fld>
             <a:endParaRPr lang="en-US"/>
           </a:p>
@@ -3300,7 +3308,7 @@
           <a:p>
             <a:fld id="{73DB11D8-BF27-47D9-AF2D-8BA02D876EFC}" type="datetimeFigureOut">
               <a:rPr lang="en-US" smtClean="0"/>
-              <a:t>3/25/2024</a:t>
+              <a:t>3/26/2024</a:t>
             </a:fld>
             <a:endParaRPr lang="en-US"/>
           </a:p>
@@ -3516,7 +3524,7 @@
           <a:p>
             <a:fld id="{73DB11D8-BF27-47D9-AF2D-8BA02D876EFC}" type="datetimeFigureOut">
               <a:rPr lang="en-US" smtClean="0"/>
-              <a:t>3/25/2024</a:t>
+              <a:t>3/26/2024</a:t>
             </a:fld>
             <a:endParaRPr lang="en-US"/>
           </a:p>
@@ -3722,7 +3730,7 @@
           <a:p>
             <a:fld id="{73DB11D8-BF27-47D9-AF2D-8BA02D876EFC}" type="datetimeFigureOut">
               <a:rPr lang="en-US" smtClean="0"/>
-              <a:t>3/25/2024</a:t>
+              <a:t>3/26/2024</a:t>
             </a:fld>
             <a:endParaRPr lang="en-US"/>
           </a:p>
@@ -4005,7 +4013,7 @@
           <a:p>
             <a:fld id="{73DB11D8-BF27-47D9-AF2D-8BA02D876EFC}" type="datetimeFigureOut">
               <a:rPr lang="en-US" smtClean="0"/>
-              <a:t>3/25/2024</a:t>
+              <a:t>3/26/2024</a:t>
             </a:fld>
             <a:endParaRPr lang="en-US"/>
           </a:p>
@@ -4278,7 +4286,7 @@
           <a:p>
             <a:fld id="{73DB11D8-BF27-47D9-AF2D-8BA02D876EFC}" type="datetimeFigureOut">
               <a:rPr lang="en-US" smtClean="0"/>
-              <a:t>3/25/2024</a:t>
+              <a:t>3/26/2024</a:t>
             </a:fld>
             <a:endParaRPr lang="en-US"/>
           </a:p>
@@ -4698,7 +4706,7 @@
           <a:p>
             <a:fld id="{73DB11D8-BF27-47D9-AF2D-8BA02D876EFC}" type="datetimeFigureOut">
               <a:rPr lang="en-US" smtClean="0"/>
-              <a:t>3/25/2024</a:t>
+              <a:t>3/26/2024</a:t>
             </a:fld>
             <a:endParaRPr lang="en-US"/>
           </a:p>
@@ -4847,7 +4855,7 @@
           <a:p>
             <a:fld id="{73DB11D8-BF27-47D9-AF2D-8BA02D876EFC}" type="datetimeFigureOut">
               <a:rPr lang="en-US" smtClean="0"/>
-              <a:t>3/25/2024</a:t>
+              <a:t>3/26/2024</a:t>
             </a:fld>
             <a:endParaRPr lang="en-US"/>
           </a:p>
@@ -4968,7 +4976,7 @@
           <a:p>
             <a:fld id="{73DB11D8-BF27-47D9-AF2D-8BA02D876EFC}" type="datetimeFigureOut">
               <a:rPr lang="en-US" smtClean="0"/>
-              <a:t>3/25/2024</a:t>
+              <a:t>3/26/2024</a:t>
             </a:fld>
             <a:endParaRPr lang="en-US"/>
           </a:p>
@@ -5287,7 +5295,7 @@
           <a:p>
             <a:fld id="{73DB11D8-BF27-47D9-AF2D-8BA02D876EFC}" type="datetimeFigureOut">
               <a:rPr lang="en-US" smtClean="0"/>
-              <a:t>3/25/2024</a:t>
+              <a:t>3/26/2024</a:t>
             </a:fld>
             <a:endParaRPr lang="en-US"/>
           </a:p>
@@ -5586,7 +5594,7 @@
           <a:p>
             <a:fld id="{73DB11D8-BF27-47D9-AF2D-8BA02D876EFC}" type="datetimeFigureOut">
               <a:rPr lang="en-US" smtClean="0"/>
-              <a:t>3/25/2024</a:t>
+              <a:t>3/26/2024</a:t>
             </a:fld>
             <a:endParaRPr lang="en-US"/>
           </a:p>
@@ -5838,7 +5846,7 @@
           <a:p>
             <a:fld id="{73DB11D8-BF27-47D9-AF2D-8BA02D876EFC}" type="datetimeFigureOut">
               <a:rPr lang="en-US" smtClean="0"/>
-              <a:t>3/25/2024</a:t>
+              <a:t>3/26/2024</a:t>
             </a:fld>
             <a:endParaRPr lang="en-US"/>
           </a:p>
@@ -6428,332 +6436,72 @@
       </p:grpSpPr>
       <p:sp>
         <p:nvSpPr>
-          <p:cNvPr id="4" name="Rectangle: Rounded Corners 3">
-            <a:extLst>
-              <a:ext uri="{FF2B5EF4-FFF2-40B4-BE49-F238E27FC236}">
-                <a16:creationId xmlns:a16="http://schemas.microsoft.com/office/drawing/2014/main" id="{1C4732B3-E9EF-7243-75B6-2021337C9271}"/>
-              </a:ext>
-            </a:extLst>
-          </p:cNvPr>
-          <p:cNvSpPr/>
-          <p:nvPr/>
-        </p:nvSpPr>
-        <p:spPr>
-          <a:xfrm>
-            <a:off x="4470401" y="1233714"/>
-            <a:ext cx="2873828" cy="1393371"/>
-          </a:xfrm>
-          <a:prstGeom prst="roundRect">
-            <a:avLst/>
-          </a:prstGeom>
-        </p:spPr>
-        <p:style>
-          <a:lnRef idx="2">
-            <a:schemeClr val="accent2">
-              <a:shade val="15000"/>
-            </a:schemeClr>
-          </a:lnRef>
-          <a:fillRef idx="1">
-            <a:schemeClr val="accent2"/>
-          </a:fillRef>
-          <a:effectRef idx="0">
-            <a:schemeClr val="accent2"/>
-          </a:effectRef>
-          <a:fontRef idx="minor">
-            <a:schemeClr val="lt1"/>
-          </a:fontRef>
-        </p:style>
-        <p:txBody>
-          <a:bodyPr rtlCol="0" anchor="ctr"/>
-          <a:lstStyle/>
-          <a:p>
-            <a:pPr algn="ctr"/>
-            <a:endParaRPr lang="en-US"/>
-          </a:p>
-        </p:txBody>
-      </p:sp>
-      <p:sp>
-        <p:nvSpPr>
-          <p:cNvPr id="5" name="TextBox 4">
-            <a:extLst>
-              <a:ext uri="{FF2B5EF4-FFF2-40B4-BE49-F238E27FC236}">
-                <a16:creationId xmlns:a16="http://schemas.microsoft.com/office/drawing/2014/main" id="{CFE4160B-FD48-3594-2DDA-7CDB2C91942D}"/>
-              </a:ext>
-            </a:extLst>
-          </p:cNvPr>
-          <p:cNvSpPr txBox="1"/>
-          <p:nvPr/>
-        </p:nvSpPr>
-        <p:spPr>
-          <a:xfrm>
-            <a:off x="940157" y="1327107"/>
-            <a:ext cx="2093330" cy="1200329"/>
-          </a:xfrm>
-          <a:prstGeom prst="rect">
-            <a:avLst/>
-          </a:prstGeom>
-          <a:noFill/>
-        </p:spPr>
-        <p:txBody>
-          <a:bodyPr wrap="none" rtlCol="0">
-            <a:spAutoFit/>
+          <p:cNvPr id="2" name="Title 1">
+            <a:extLst>
+              <a:ext uri="{FF2B5EF4-FFF2-40B4-BE49-F238E27FC236}">
+                <a16:creationId xmlns:a16="http://schemas.microsoft.com/office/drawing/2014/main" id="{FD70D665-2CC3-80BC-D445-5567F8747D5B}"/>
+              </a:ext>
+            </a:extLst>
+          </p:cNvPr>
+          <p:cNvSpPr>
+            <a:spLocks noGrp="1"/>
+          </p:cNvSpPr>
+          <p:nvPr>
+            <p:ph type="title"/>
+          </p:nvPr>
+        </p:nvSpPr>
+        <p:spPr/>
+        <p:txBody>
+          <a:bodyPr>
+            <a:normAutofit fontScale="90000"/>
           </a:bodyPr>
           <a:lstStyle/>
           <a:p>
             <a:r>
-              <a:rPr lang="en-US" sz="2400" b="1" dirty="0">
-                <a:solidFill>
-                  <a:schemeClr val="accent3"/>
-                </a:solidFill>
-              </a:rPr>
-              <a:t>Input feature 1</a:t>
-            </a:r>
-          </a:p>
-          <a:p>
-            <a:r>
-              <a:rPr lang="en-US" sz="2400" b="1" dirty="0">
-                <a:solidFill>
-                  <a:schemeClr val="accent3"/>
-                </a:solidFill>
-              </a:rPr>
-              <a:t>Input feature 2</a:t>
-            </a:r>
-          </a:p>
-          <a:p>
-            <a:r>
-              <a:rPr lang="en-US" sz="2400" b="1" dirty="0">
-                <a:solidFill>
-                  <a:schemeClr val="accent3"/>
-                </a:solidFill>
-              </a:rPr>
-              <a:t>Input feature 3</a:t>
-            </a:r>
-          </a:p>
-        </p:txBody>
-      </p:sp>
-      <p:cxnSp>
-        <p:nvCxnSpPr>
-          <p:cNvPr id="6" name="Straight Arrow Connector 5">
-            <a:extLst>
-              <a:ext uri="{FF2B5EF4-FFF2-40B4-BE49-F238E27FC236}">
-                <a16:creationId xmlns:a16="http://schemas.microsoft.com/office/drawing/2014/main" id="{A959CDBA-2C23-1B9D-EE91-5721EC364A56}"/>
-              </a:ext>
-            </a:extLst>
-          </p:cNvPr>
-          <p:cNvCxnSpPr>
-            <a:cxnSpLocks/>
-            <a:endCxn id="4" idx="1"/>
-          </p:cNvCxnSpPr>
-          <p:nvPr/>
-        </p:nvCxnSpPr>
-        <p:spPr>
-          <a:xfrm>
-            <a:off x="3009448" y="1568741"/>
-            <a:ext cx="1460953" cy="361659"/>
-          </a:xfrm>
-          <a:prstGeom prst="straightConnector1">
-            <a:avLst/>
-          </a:prstGeom>
-          <a:ln w="76200">
-            <a:solidFill>
-              <a:schemeClr val="accent3"/>
-            </a:solidFill>
-            <a:tailEnd type="triangle"/>
-          </a:ln>
-        </p:spPr>
-        <p:style>
-          <a:lnRef idx="1">
-            <a:schemeClr val="accent1"/>
-          </a:lnRef>
-          <a:fillRef idx="0">
-            <a:schemeClr val="accent1"/>
-          </a:fillRef>
-          <a:effectRef idx="0">
-            <a:schemeClr val="accent1"/>
-          </a:effectRef>
-          <a:fontRef idx="minor">
-            <a:schemeClr val="tx1"/>
-          </a:fontRef>
-        </p:style>
-      </p:cxnSp>
-      <p:cxnSp>
-        <p:nvCxnSpPr>
-          <p:cNvPr id="10" name="Straight Arrow Connector 9">
-            <a:extLst>
-              <a:ext uri="{FF2B5EF4-FFF2-40B4-BE49-F238E27FC236}">
-                <a16:creationId xmlns:a16="http://schemas.microsoft.com/office/drawing/2014/main" id="{81BC5D95-8C89-A70D-45F3-1D50953726FB}"/>
-              </a:ext>
-            </a:extLst>
-          </p:cNvPr>
-          <p:cNvCxnSpPr>
-            <a:cxnSpLocks/>
-            <a:stCxn id="5" idx="3"/>
-            <a:endCxn id="4" idx="1"/>
-          </p:cNvCxnSpPr>
-          <p:nvPr/>
-        </p:nvCxnSpPr>
-        <p:spPr>
-          <a:xfrm>
-            <a:off x="3033487" y="1927272"/>
-            <a:ext cx="1436914" cy="3128"/>
-          </a:xfrm>
-          <a:prstGeom prst="straightConnector1">
-            <a:avLst/>
-          </a:prstGeom>
-          <a:ln w="76200">
-            <a:solidFill>
-              <a:schemeClr val="accent3"/>
-            </a:solidFill>
-            <a:tailEnd type="triangle"/>
-          </a:ln>
-        </p:spPr>
-        <p:style>
-          <a:lnRef idx="1">
-            <a:schemeClr val="accent1"/>
-          </a:lnRef>
-          <a:fillRef idx="0">
-            <a:schemeClr val="accent1"/>
-          </a:fillRef>
-          <a:effectRef idx="0">
-            <a:schemeClr val="accent1"/>
-          </a:effectRef>
-          <a:fontRef idx="minor">
-            <a:schemeClr val="tx1"/>
-          </a:fontRef>
-        </p:style>
-      </p:cxnSp>
-      <p:cxnSp>
-        <p:nvCxnSpPr>
-          <p:cNvPr id="15" name="Straight Arrow Connector 14">
-            <a:extLst>
-              <a:ext uri="{FF2B5EF4-FFF2-40B4-BE49-F238E27FC236}">
-                <a16:creationId xmlns:a16="http://schemas.microsoft.com/office/drawing/2014/main" id="{486A548D-7A3D-4536-E349-AEEC841E45FC}"/>
-              </a:ext>
-            </a:extLst>
-          </p:cNvPr>
-          <p:cNvCxnSpPr>
-            <a:cxnSpLocks/>
-            <a:endCxn id="4" idx="1"/>
-          </p:cNvCxnSpPr>
-          <p:nvPr/>
-        </p:nvCxnSpPr>
-        <p:spPr>
-          <a:xfrm flipV="1">
-            <a:off x="3051824" y="1930400"/>
-            <a:ext cx="1418577" cy="335027"/>
-          </a:xfrm>
-          <a:prstGeom prst="straightConnector1">
-            <a:avLst/>
-          </a:prstGeom>
-          <a:ln w="76200">
-            <a:solidFill>
-              <a:schemeClr val="accent3"/>
-            </a:solidFill>
-            <a:tailEnd type="triangle"/>
-          </a:ln>
-        </p:spPr>
-        <p:style>
-          <a:lnRef idx="1">
-            <a:schemeClr val="accent1"/>
-          </a:lnRef>
-          <a:fillRef idx="0">
-            <a:schemeClr val="accent1"/>
-          </a:fillRef>
-          <a:effectRef idx="0">
-            <a:schemeClr val="accent1"/>
-          </a:effectRef>
-          <a:fontRef idx="minor">
-            <a:schemeClr val="tx1"/>
-          </a:fontRef>
-        </p:style>
-      </p:cxnSp>
-      <p:cxnSp>
-        <p:nvCxnSpPr>
-          <p:cNvPr id="18" name="Straight Arrow Connector 17">
-            <a:extLst>
-              <a:ext uri="{FF2B5EF4-FFF2-40B4-BE49-F238E27FC236}">
-                <a16:creationId xmlns:a16="http://schemas.microsoft.com/office/drawing/2014/main" id="{76801C1F-13E7-DDC1-5B7D-421ADC2B72E0}"/>
-              </a:ext>
-            </a:extLst>
-          </p:cNvPr>
-          <p:cNvCxnSpPr>
-            <a:cxnSpLocks/>
-          </p:cNvCxnSpPr>
-          <p:nvPr/>
-        </p:nvCxnSpPr>
-        <p:spPr>
-          <a:xfrm>
-            <a:off x="7344229" y="1927272"/>
-            <a:ext cx="1117600" cy="0"/>
-          </a:xfrm>
-          <a:prstGeom prst="straightConnector1">
-            <a:avLst/>
-          </a:prstGeom>
-          <a:ln w="76200">
-            <a:solidFill>
-              <a:schemeClr val="accent3"/>
-            </a:solidFill>
-            <a:tailEnd type="triangle"/>
-          </a:ln>
-        </p:spPr>
-        <p:style>
-          <a:lnRef idx="1">
-            <a:schemeClr val="accent1"/>
-          </a:lnRef>
-          <a:fillRef idx="0">
-            <a:schemeClr val="accent1"/>
-          </a:fillRef>
-          <a:effectRef idx="0">
-            <a:schemeClr val="accent1"/>
-          </a:effectRef>
-          <a:fontRef idx="minor">
-            <a:schemeClr val="tx1"/>
-          </a:fontRef>
-        </p:style>
-      </p:cxnSp>
-      <p:sp>
-        <p:nvSpPr>
-          <p:cNvPr id="20" name="TextBox 19">
-            <a:extLst>
-              <a:ext uri="{FF2B5EF4-FFF2-40B4-BE49-F238E27FC236}">
-                <a16:creationId xmlns:a16="http://schemas.microsoft.com/office/drawing/2014/main" id="{DDD1640F-C347-1A67-CD1F-BC09CB8FE516}"/>
-              </a:ext>
-            </a:extLst>
-          </p:cNvPr>
-          <p:cNvSpPr txBox="1"/>
-          <p:nvPr/>
-        </p:nvSpPr>
-        <p:spPr>
-          <a:xfrm>
-            <a:off x="8468122" y="1756229"/>
-            <a:ext cx="1226618" cy="461665"/>
-          </a:xfrm>
-          <a:prstGeom prst="rect">
-            <a:avLst/>
-          </a:prstGeom>
-          <a:noFill/>
-        </p:spPr>
-        <p:txBody>
-          <a:bodyPr wrap="none" rtlCol="0">
-            <a:spAutoFit/>
-          </a:bodyPr>
-          <a:lstStyle/>
-          <a:p>
-            <a:r>
-              <a:rPr lang="en-US" sz="2400" b="1" dirty="0">
-                <a:solidFill>
-                  <a:schemeClr val="accent3"/>
-                </a:solidFill>
-              </a:rPr>
-              <a:t>Outputs</a:t>
-            </a:r>
+              <a:rPr lang="en-US" dirty="0"/>
+              <a:t>Permutation feature importance</a:t>
+            </a:r>
+          </a:p>
+        </p:txBody>
+      </p:sp>
+      <p:sp>
+        <p:nvSpPr>
+          <p:cNvPr id="3" name="Content Placeholder 2">
+            <a:extLst>
+              <a:ext uri="{FF2B5EF4-FFF2-40B4-BE49-F238E27FC236}">
+                <a16:creationId xmlns:a16="http://schemas.microsoft.com/office/drawing/2014/main" id="{205F080B-E378-39CD-56EC-381878F536CE}"/>
+              </a:ext>
+            </a:extLst>
+          </p:cNvPr>
+          <p:cNvSpPr>
+            <a:spLocks noGrp="1"/>
+          </p:cNvSpPr>
+          <p:nvPr>
+            <p:ph idx="1"/>
+          </p:nvPr>
+        </p:nvSpPr>
+        <p:spPr/>
+        <p:txBody>
+          <a:bodyPr/>
+          <a:lstStyle/>
+          <a:p>
+            <a:r>
+              <a:rPr lang="en-US" dirty="0"/>
+              <a:t>Difference in model output after permutation of input features</a:t>
+            </a:r>
+          </a:p>
+          <a:p>
+            <a:pPr marL="0" indent="0">
+              <a:buNone/>
+            </a:pPr>
+            <a:endParaRPr lang="en-US" dirty="0"/>
           </a:p>
         </p:txBody>
       </p:sp>
     </p:spTree>
     <p:extLst>
       <p:ext uri="{BB962C8B-B14F-4D97-AF65-F5344CB8AC3E}">
-        <p14:creationId xmlns:p14="http://schemas.microsoft.com/office/powerpoint/2010/main" val="627550303"/>
+        <p14:creationId xmlns:p14="http://schemas.microsoft.com/office/powerpoint/2010/main" val="1932093382"/>
       </p:ext>
     </p:extLst>
   </p:cSld>
@@ -7104,334 +6852,10 @@
           </a:p>
         </p:txBody>
       </p:sp>
-      <p:sp>
-        <p:nvSpPr>
-          <p:cNvPr id="21" name="Rectangle: Rounded Corners 20">
-            <a:extLst>
-              <a:ext uri="{FF2B5EF4-FFF2-40B4-BE49-F238E27FC236}">
-                <a16:creationId xmlns:a16="http://schemas.microsoft.com/office/drawing/2014/main" id="{33170646-BB83-AFBF-6EB8-84953D8FCF35}"/>
-              </a:ext>
-            </a:extLst>
-          </p:cNvPr>
-          <p:cNvSpPr/>
-          <p:nvPr/>
-        </p:nvSpPr>
-        <p:spPr>
-          <a:xfrm>
-            <a:off x="4470401" y="3794703"/>
-            <a:ext cx="2873828" cy="1393371"/>
-          </a:xfrm>
-          <a:prstGeom prst="roundRect">
-            <a:avLst/>
-          </a:prstGeom>
-        </p:spPr>
-        <p:style>
-          <a:lnRef idx="2">
-            <a:schemeClr val="accent2">
-              <a:shade val="15000"/>
-            </a:schemeClr>
-          </a:lnRef>
-          <a:fillRef idx="1">
-            <a:schemeClr val="accent2"/>
-          </a:fillRef>
-          <a:effectRef idx="0">
-            <a:schemeClr val="accent2"/>
-          </a:effectRef>
-          <a:fontRef idx="minor">
-            <a:schemeClr val="lt1"/>
-          </a:fontRef>
-        </p:style>
-        <p:txBody>
-          <a:bodyPr rtlCol="0" anchor="ctr"/>
-          <a:lstStyle/>
-          <a:p>
-            <a:pPr algn="ctr"/>
-            <a:endParaRPr lang="en-US"/>
-          </a:p>
-        </p:txBody>
-      </p:sp>
-      <p:sp>
-        <p:nvSpPr>
-          <p:cNvPr id="22" name="TextBox 21">
-            <a:extLst>
-              <a:ext uri="{FF2B5EF4-FFF2-40B4-BE49-F238E27FC236}">
-                <a16:creationId xmlns:a16="http://schemas.microsoft.com/office/drawing/2014/main" id="{9654E92F-2E3F-4102-4D1F-BC52B54203CE}"/>
-              </a:ext>
-            </a:extLst>
-          </p:cNvPr>
-          <p:cNvSpPr txBox="1"/>
-          <p:nvPr/>
-        </p:nvSpPr>
-        <p:spPr>
-          <a:xfrm>
-            <a:off x="916118" y="3891224"/>
-            <a:ext cx="2093330" cy="1200329"/>
-          </a:xfrm>
-          <a:prstGeom prst="rect">
-            <a:avLst/>
-          </a:prstGeom>
-          <a:noFill/>
-        </p:spPr>
-        <p:txBody>
-          <a:bodyPr wrap="none" rtlCol="0">
-            <a:spAutoFit/>
-          </a:bodyPr>
-          <a:lstStyle/>
-          <a:p>
-            <a:r>
-              <a:rPr lang="en-US" sz="2400" b="1" dirty="0">
-                <a:solidFill>
-                  <a:schemeClr val="accent1"/>
-                </a:solidFill>
-              </a:rPr>
-              <a:t>Input feature 1</a:t>
-            </a:r>
-          </a:p>
-          <a:p>
-            <a:r>
-              <a:rPr lang="en-US" sz="2400" b="1" dirty="0">
-                <a:solidFill>
-                  <a:schemeClr val="accent3"/>
-                </a:solidFill>
-              </a:rPr>
-              <a:t>Input feature 2</a:t>
-            </a:r>
-          </a:p>
-          <a:p>
-            <a:r>
-              <a:rPr lang="en-US" sz="2400" b="1" dirty="0">
-                <a:solidFill>
-                  <a:schemeClr val="accent3"/>
-                </a:solidFill>
-              </a:rPr>
-              <a:t>Input feature 3</a:t>
-            </a:r>
-          </a:p>
-        </p:txBody>
-      </p:sp>
-      <p:cxnSp>
-        <p:nvCxnSpPr>
-          <p:cNvPr id="23" name="Straight Arrow Connector 22">
-            <a:extLst>
-              <a:ext uri="{FF2B5EF4-FFF2-40B4-BE49-F238E27FC236}">
-                <a16:creationId xmlns:a16="http://schemas.microsoft.com/office/drawing/2014/main" id="{5D7215C5-51BE-7378-31A0-98F1B711E79E}"/>
-              </a:ext>
-            </a:extLst>
-          </p:cNvPr>
-          <p:cNvCxnSpPr>
-            <a:cxnSpLocks/>
-            <a:endCxn id="21" idx="1"/>
-          </p:cNvCxnSpPr>
-          <p:nvPr/>
-        </p:nvCxnSpPr>
-        <p:spPr>
-          <a:xfrm>
-            <a:off x="3009448" y="4118994"/>
-            <a:ext cx="1460953" cy="372395"/>
-          </a:xfrm>
-          <a:prstGeom prst="straightConnector1">
-            <a:avLst/>
-          </a:prstGeom>
-          <a:ln w="76200">
-            <a:solidFill>
-              <a:schemeClr val="accent3"/>
-            </a:solidFill>
-            <a:tailEnd type="triangle"/>
-          </a:ln>
-        </p:spPr>
-        <p:style>
-          <a:lnRef idx="1">
-            <a:schemeClr val="accent1"/>
-          </a:lnRef>
-          <a:fillRef idx="0">
-            <a:schemeClr val="accent1"/>
-          </a:fillRef>
-          <a:effectRef idx="0">
-            <a:schemeClr val="accent1"/>
-          </a:effectRef>
-          <a:fontRef idx="minor">
-            <a:schemeClr val="tx1"/>
-          </a:fontRef>
-        </p:style>
-      </p:cxnSp>
-      <p:cxnSp>
-        <p:nvCxnSpPr>
-          <p:cNvPr id="24" name="Straight Arrow Connector 23">
-            <a:extLst>
-              <a:ext uri="{FF2B5EF4-FFF2-40B4-BE49-F238E27FC236}">
-                <a16:creationId xmlns:a16="http://schemas.microsoft.com/office/drawing/2014/main" id="{16956EAD-7FB4-D023-2000-F9A04042B6EE}"/>
-              </a:ext>
-            </a:extLst>
-          </p:cNvPr>
-          <p:cNvCxnSpPr>
-            <a:cxnSpLocks/>
-            <a:stCxn id="22" idx="3"/>
-            <a:endCxn id="21" idx="1"/>
-          </p:cNvCxnSpPr>
-          <p:nvPr/>
-        </p:nvCxnSpPr>
-        <p:spPr>
-          <a:xfrm>
-            <a:off x="3009448" y="4491389"/>
-            <a:ext cx="1460953" cy="0"/>
-          </a:xfrm>
-          <a:prstGeom prst="straightConnector1">
-            <a:avLst/>
-          </a:prstGeom>
-          <a:ln w="76200">
-            <a:solidFill>
-              <a:schemeClr val="accent3"/>
-            </a:solidFill>
-            <a:tailEnd type="triangle"/>
-          </a:ln>
-        </p:spPr>
-        <p:style>
-          <a:lnRef idx="1">
-            <a:schemeClr val="accent1"/>
-          </a:lnRef>
-          <a:fillRef idx="0">
-            <a:schemeClr val="accent1"/>
-          </a:fillRef>
-          <a:effectRef idx="0">
-            <a:schemeClr val="accent1"/>
-          </a:effectRef>
-          <a:fontRef idx="minor">
-            <a:schemeClr val="tx1"/>
-          </a:fontRef>
-        </p:style>
-      </p:cxnSp>
-      <p:cxnSp>
-        <p:nvCxnSpPr>
-          <p:cNvPr id="25" name="Straight Arrow Connector 24">
-            <a:extLst>
-              <a:ext uri="{FF2B5EF4-FFF2-40B4-BE49-F238E27FC236}">
-                <a16:creationId xmlns:a16="http://schemas.microsoft.com/office/drawing/2014/main" id="{B0D13E69-5057-4E56-755B-A8FAD9706512}"/>
-              </a:ext>
-            </a:extLst>
-          </p:cNvPr>
-          <p:cNvCxnSpPr>
-            <a:cxnSpLocks/>
-            <a:endCxn id="21" idx="1"/>
-          </p:cNvCxnSpPr>
-          <p:nvPr/>
-        </p:nvCxnSpPr>
-        <p:spPr>
-          <a:xfrm flipV="1">
-            <a:off x="3033487" y="4491389"/>
-            <a:ext cx="1436914" cy="324291"/>
-          </a:xfrm>
-          <a:prstGeom prst="straightConnector1">
-            <a:avLst/>
-          </a:prstGeom>
-          <a:ln w="76200">
-            <a:solidFill>
-              <a:schemeClr val="accent3"/>
-            </a:solidFill>
-            <a:tailEnd type="triangle"/>
-          </a:ln>
-        </p:spPr>
-        <p:style>
-          <a:lnRef idx="1">
-            <a:schemeClr val="accent1"/>
-          </a:lnRef>
-          <a:fillRef idx="0">
-            <a:schemeClr val="accent1"/>
-          </a:fillRef>
-          <a:effectRef idx="0">
-            <a:schemeClr val="accent1"/>
-          </a:effectRef>
-          <a:fontRef idx="minor">
-            <a:schemeClr val="tx1"/>
-          </a:fontRef>
-        </p:style>
-      </p:cxnSp>
-      <p:cxnSp>
-        <p:nvCxnSpPr>
-          <p:cNvPr id="26" name="Straight Arrow Connector 25">
-            <a:extLst>
-              <a:ext uri="{FF2B5EF4-FFF2-40B4-BE49-F238E27FC236}">
-                <a16:creationId xmlns:a16="http://schemas.microsoft.com/office/drawing/2014/main" id="{BFCDD201-5652-02AA-26A1-9B68EAFD25F6}"/>
-              </a:ext>
-            </a:extLst>
-          </p:cNvPr>
-          <p:cNvCxnSpPr>
-            <a:cxnSpLocks/>
-          </p:cNvCxnSpPr>
-          <p:nvPr/>
-        </p:nvCxnSpPr>
-        <p:spPr>
-          <a:xfrm>
-            <a:off x="7344229" y="4488261"/>
-            <a:ext cx="1117600" cy="0"/>
-          </a:xfrm>
-          <a:prstGeom prst="straightConnector1">
-            <a:avLst/>
-          </a:prstGeom>
-          <a:ln w="76200">
-            <a:solidFill>
-              <a:schemeClr val="accent3"/>
-            </a:solidFill>
-            <a:tailEnd type="triangle"/>
-          </a:ln>
-        </p:spPr>
-        <p:style>
-          <a:lnRef idx="1">
-            <a:schemeClr val="accent1"/>
-          </a:lnRef>
-          <a:fillRef idx="0">
-            <a:schemeClr val="accent1"/>
-          </a:fillRef>
-          <a:effectRef idx="0">
-            <a:schemeClr val="accent1"/>
-          </a:effectRef>
-          <a:fontRef idx="minor">
-            <a:schemeClr val="tx1"/>
-          </a:fontRef>
-        </p:style>
-      </p:cxnSp>
-      <p:sp>
-        <p:nvSpPr>
-          <p:cNvPr id="27" name="TextBox 26">
-            <a:extLst>
-              <a:ext uri="{FF2B5EF4-FFF2-40B4-BE49-F238E27FC236}">
-                <a16:creationId xmlns:a16="http://schemas.microsoft.com/office/drawing/2014/main" id="{E64C7C82-5083-B9D6-C825-039A99FD5339}"/>
-              </a:ext>
-            </a:extLst>
-          </p:cNvPr>
-          <p:cNvSpPr txBox="1"/>
-          <p:nvPr/>
-        </p:nvSpPr>
-        <p:spPr>
-          <a:xfrm>
-            <a:off x="8468122" y="4317218"/>
-            <a:ext cx="1226618" cy="461665"/>
-          </a:xfrm>
-          <a:prstGeom prst="rect">
-            <a:avLst/>
-          </a:prstGeom>
-          <a:noFill/>
-        </p:spPr>
-        <p:txBody>
-          <a:bodyPr wrap="none" rtlCol="0">
-            <a:spAutoFit/>
-          </a:bodyPr>
-          <a:lstStyle/>
-          <a:p>
-            <a:r>
-              <a:rPr lang="en-US" sz="2400" b="1" dirty="0">
-                <a:solidFill>
-                  <a:schemeClr val="accent3"/>
-                </a:solidFill>
-              </a:rPr>
-              <a:t>Outputs</a:t>
-            </a:r>
-          </a:p>
-        </p:txBody>
-      </p:sp>
     </p:spTree>
     <p:extLst>
       <p:ext uri="{BB962C8B-B14F-4D97-AF65-F5344CB8AC3E}">
-        <p14:creationId xmlns:p14="http://schemas.microsoft.com/office/powerpoint/2010/main" val="567277806"/>
+        <p14:creationId xmlns:p14="http://schemas.microsoft.com/office/powerpoint/2010/main" val="627550303"/>
       </p:ext>
     </p:extLst>
   </p:cSld>
@@ -8106,95 +7530,10 @@
           </a:p>
         </p:txBody>
       </p:sp>
-      <p:cxnSp>
-        <p:nvCxnSpPr>
-          <p:cNvPr id="29" name="Straight Arrow Connector 28">
-            <a:extLst>
-              <a:ext uri="{FF2B5EF4-FFF2-40B4-BE49-F238E27FC236}">
-                <a16:creationId xmlns:a16="http://schemas.microsoft.com/office/drawing/2014/main" id="{93FF8F84-5F55-0D0D-2A19-E3A8B7C371E3}"/>
-              </a:ext>
-            </a:extLst>
-          </p:cNvPr>
-          <p:cNvCxnSpPr>
-            <a:stCxn id="20" idx="2"/>
-            <a:endCxn id="27" idx="0"/>
-          </p:cNvCxnSpPr>
-          <p:nvPr/>
-        </p:nvCxnSpPr>
-        <p:spPr>
-          <a:xfrm>
-            <a:off x="9081431" y="2217894"/>
-            <a:ext cx="0" cy="2099324"/>
-          </a:xfrm>
-          <a:prstGeom prst="straightConnector1">
-            <a:avLst/>
-          </a:prstGeom>
-          <a:ln w="76200">
-            <a:solidFill>
-              <a:schemeClr val="accent3"/>
-            </a:solidFill>
-            <a:headEnd type="triangle"/>
-            <a:tailEnd type="triangle"/>
-          </a:ln>
-        </p:spPr>
-        <p:style>
-          <a:lnRef idx="1">
-            <a:schemeClr val="accent1"/>
-          </a:lnRef>
-          <a:fillRef idx="0">
-            <a:schemeClr val="accent1"/>
-          </a:fillRef>
-          <a:effectRef idx="0">
-            <a:schemeClr val="accent1"/>
-          </a:effectRef>
-          <a:fontRef idx="minor">
-            <a:schemeClr val="tx1"/>
-          </a:fontRef>
-        </p:style>
-      </p:cxnSp>
-      <p:sp>
-        <p:nvSpPr>
-          <p:cNvPr id="30" name="TextBox 29">
-            <a:extLst>
-              <a:ext uri="{FF2B5EF4-FFF2-40B4-BE49-F238E27FC236}">
-                <a16:creationId xmlns:a16="http://schemas.microsoft.com/office/drawing/2014/main" id="{339E6189-C977-5B3F-D1E8-E8EA275E1C7A}"/>
-              </a:ext>
-            </a:extLst>
-          </p:cNvPr>
-          <p:cNvSpPr txBox="1"/>
-          <p:nvPr/>
-        </p:nvSpPr>
-        <p:spPr>
-          <a:xfrm>
-            <a:off x="9063094" y="3059668"/>
-            <a:ext cx="1661224" cy="461665"/>
-          </a:xfrm>
-          <a:prstGeom prst="rect">
-            <a:avLst/>
-          </a:prstGeom>
-          <a:noFill/>
-        </p:spPr>
-        <p:txBody>
-          <a:bodyPr wrap="none" rtlCol="0">
-            <a:spAutoFit/>
-          </a:bodyPr>
-          <a:lstStyle/>
-          <a:p>
-            <a:r>
-              <a:rPr lang="en-US" sz="2400" b="1" dirty="0">
-                <a:solidFill>
-                  <a:schemeClr val="accent3"/>
-                </a:solidFill>
-              </a:rPr>
-              <a:t>Importance</a:t>
-            </a:r>
-          </a:p>
-        </p:txBody>
-      </p:sp>
     </p:spTree>
     <p:extLst>
       <p:ext uri="{BB962C8B-B14F-4D97-AF65-F5344CB8AC3E}">
-        <p14:creationId xmlns:p14="http://schemas.microsoft.com/office/powerpoint/2010/main" val="2054563628"/>
+        <p14:creationId xmlns:p14="http://schemas.microsoft.com/office/powerpoint/2010/main" val="567277806"/>
       </p:ext>
     </p:extLst>
   </p:cSld>
@@ -8632,7 +7971,7 @@
             <a:r>
               <a:rPr lang="en-US" sz="2400" b="1" dirty="0">
                 <a:solidFill>
-                  <a:schemeClr val="accent1"/>
+                  <a:schemeClr val="accent3"/>
                 </a:solidFill>
               </a:rPr>
               <a:t>Input feature 2</a:t>
@@ -8642,7 +7981,7 @@
             <a:r>
               <a:rPr lang="en-US" sz="2400" b="1" dirty="0">
                 <a:solidFill>
-                  <a:schemeClr val="accent1"/>
+                  <a:schemeClr val="accent3"/>
                 </a:solidFill>
               </a:rPr>
               <a:t>Input feature 3</a:t>
@@ -8957,7 +8296,7 @@
     </p:spTree>
     <p:extLst>
       <p:ext uri="{BB962C8B-B14F-4D97-AF65-F5344CB8AC3E}">
-        <p14:creationId xmlns:p14="http://schemas.microsoft.com/office/powerpoint/2010/main" val="2940133301"/>
+        <p14:creationId xmlns:p14="http://schemas.microsoft.com/office/powerpoint/2010/main" val="2054563628"/>
       </p:ext>
     </p:extLst>
   </p:cSld>
@@ -8986,88 +8325,741 @@
       </p:grpSpPr>
       <p:sp>
         <p:nvSpPr>
-          <p:cNvPr id="2" name="Title 1">
-            <a:extLst>
-              <a:ext uri="{FF2B5EF4-FFF2-40B4-BE49-F238E27FC236}">
-                <a16:creationId xmlns:a16="http://schemas.microsoft.com/office/drawing/2014/main" id="{FD70D665-2CC3-80BC-D445-5567F8747D5B}"/>
-              </a:ext>
-            </a:extLst>
-          </p:cNvPr>
-          <p:cNvSpPr>
-            <a:spLocks noGrp="1"/>
-          </p:cNvSpPr>
-          <p:nvPr>
-            <p:ph type="title"/>
-          </p:nvPr>
-        </p:nvSpPr>
-        <p:spPr/>
-        <p:txBody>
-          <a:bodyPr/>
-          <a:lstStyle/>
-          <a:p>
-            <a:r>
-              <a:rPr lang="en-US" dirty="0"/>
-              <a:t>Impurity feature importance</a:t>
-            </a:r>
-          </a:p>
-        </p:txBody>
-      </p:sp>
-      <p:sp>
-        <p:nvSpPr>
-          <p:cNvPr id="3" name="Content Placeholder 2">
-            <a:extLst>
-              <a:ext uri="{FF2B5EF4-FFF2-40B4-BE49-F238E27FC236}">
-                <a16:creationId xmlns:a16="http://schemas.microsoft.com/office/drawing/2014/main" id="{205F080B-E378-39CD-56EC-381878F536CE}"/>
-              </a:ext>
-            </a:extLst>
-          </p:cNvPr>
-          <p:cNvSpPr>
-            <a:spLocks noGrp="1"/>
-          </p:cNvSpPr>
-          <p:nvPr>
-            <p:ph idx="1"/>
-          </p:nvPr>
-        </p:nvSpPr>
-        <p:spPr/>
-        <p:txBody>
-          <a:bodyPr/>
-          <a:lstStyle/>
-          <a:p>
-            <a:r>
-              <a:rPr lang="en-US" dirty="0"/>
-              <a:t>Difference in model output after permutation of input features</a:t>
-            </a:r>
-          </a:p>
-          <a:p>
-            <a:endParaRPr lang="en-US" dirty="0"/>
-          </a:p>
-          <a:p>
-            <a:pPr marL="0" indent="0">
-              <a:buNone/>
-            </a:pPr>
-            <a:r>
-              <a:rPr lang="en-US" dirty="0"/>
-              <a:t>+ Applicable to all models	- Slow</a:t>
-            </a:r>
-          </a:p>
-          <a:p>
-            <a:pPr marL="0" indent="0">
-              <a:buNone/>
-            </a:pPr>
-            <a:r>
-              <a:rPr lang="en-US" dirty="0"/>
-              <a:t>					-  Limited accounting for 			   				    complex non-linear interactions</a:t>
-            </a:r>
-          </a:p>
-          <a:p>
-            <a:endParaRPr lang="en-US" dirty="0"/>
+          <p:cNvPr id="4" name="Rectangle: Rounded Corners 3">
+            <a:extLst>
+              <a:ext uri="{FF2B5EF4-FFF2-40B4-BE49-F238E27FC236}">
+                <a16:creationId xmlns:a16="http://schemas.microsoft.com/office/drawing/2014/main" id="{1C4732B3-E9EF-7243-75B6-2021337C9271}"/>
+              </a:ext>
+            </a:extLst>
+          </p:cNvPr>
+          <p:cNvSpPr/>
+          <p:nvPr/>
+        </p:nvSpPr>
+        <p:spPr>
+          <a:xfrm>
+            <a:off x="4470401" y="1233714"/>
+            <a:ext cx="2873828" cy="1393371"/>
+          </a:xfrm>
+          <a:prstGeom prst="roundRect">
+            <a:avLst/>
+          </a:prstGeom>
+        </p:spPr>
+        <p:style>
+          <a:lnRef idx="2">
+            <a:schemeClr val="accent2">
+              <a:shade val="15000"/>
+            </a:schemeClr>
+          </a:lnRef>
+          <a:fillRef idx="1">
+            <a:schemeClr val="accent2"/>
+          </a:fillRef>
+          <a:effectRef idx="0">
+            <a:schemeClr val="accent2"/>
+          </a:effectRef>
+          <a:fontRef idx="minor">
+            <a:schemeClr val="lt1"/>
+          </a:fontRef>
+        </p:style>
+        <p:txBody>
+          <a:bodyPr rtlCol="0" anchor="ctr"/>
+          <a:lstStyle/>
+          <a:p>
+            <a:pPr algn="ctr"/>
+            <a:endParaRPr lang="en-US"/>
+          </a:p>
+        </p:txBody>
+      </p:sp>
+      <p:sp>
+        <p:nvSpPr>
+          <p:cNvPr id="5" name="TextBox 4">
+            <a:extLst>
+              <a:ext uri="{FF2B5EF4-FFF2-40B4-BE49-F238E27FC236}">
+                <a16:creationId xmlns:a16="http://schemas.microsoft.com/office/drawing/2014/main" id="{CFE4160B-FD48-3594-2DDA-7CDB2C91942D}"/>
+              </a:ext>
+            </a:extLst>
+          </p:cNvPr>
+          <p:cNvSpPr txBox="1"/>
+          <p:nvPr/>
+        </p:nvSpPr>
+        <p:spPr>
+          <a:xfrm>
+            <a:off x="940157" y="1327107"/>
+            <a:ext cx="2093330" cy="1200329"/>
+          </a:xfrm>
+          <a:prstGeom prst="rect">
+            <a:avLst/>
+          </a:prstGeom>
+          <a:noFill/>
+        </p:spPr>
+        <p:txBody>
+          <a:bodyPr wrap="none" rtlCol="0">
+            <a:spAutoFit/>
+          </a:bodyPr>
+          <a:lstStyle/>
+          <a:p>
+            <a:r>
+              <a:rPr lang="en-US" sz="2400" b="1" dirty="0">
+                <a:solidFill>
+                  <a:schemeClr val="accent3"/>
+                </a:solidFill>
+              </a:rPr>
+              <a:t>Input feature 1</a:t>
+            </a:r>
+          </a:p>
+          <a:p>
+            <a:r>
+              <a:rPr lang="en-US" sz="2400" b="1" dirty="0">
+                <a:solidFill>
+                  <a:schemeClr val="accent3"/>
+                </a:solidFill>
+              </a:rPr>
+              <a:t>Input feature 2</a:t>
+            </a:r>
+          </a:p>
+          <a:p>
+            <a:r>
+              <a:rPr lang="en-US" sz="2400" b="1" dirty="0">
+                <a:solidFill>
+                  <a:schemeClr val="accent3"/>
+                </a:solidFill>
+              </a:rPr>
+              <a:t>Input feature 3</a:t>
+            </a:r>
+          </a:p>
+        </p:txBody>
+      </p:sp>
+      <p:cxnSp>
+        <p:nvCxnSpPr>
+          <p:cNvPr id="6" name="Straight Arrow Connector 5">
+            <a:extLst>
+              <a:ext uri="{FF2B5EF4-FFF2-40B4-BE49-F238E27FC236}">
+                <a16:creationId xmlns:a16="http://schemas.microsoft.com/office/drawing/2014/main" id="{A959CDBA-2C23-1B9D-EE91-5721EC364A56}"/>
+              </a:ext>
+            </a:extLst>
+          </p:cNvPr>
+          <p:cNvCxnSpPr>
+            <a:cxnSpLocks/>
+            <a:endCxn id="4" idx="1"/>
+          </p:cNvCxnSpPr>
+          <p:nvPr/>
+        </p:nvCxnSpPr>
+        <p:spPr>
+          <a:xfrm>
+            <a:off x="3009448" y="1568741"/>
+            <a:ext cx="1460953" cy="361659"/>
+          </a:xfrm>
+          <a:prstGeom prst="straightConnector1">
+            <a:avLst/>
+          </a:prstGeom>
+          <a:ln w="76200">
+            <a:solidFill>
+              <a:schemeClr val="accent3"/>
+            </a:solidFill>
+            <a:tailEnd type="triangle"/>
+          </a:ln>
+        </p:spPr>
+        <p:style>
+          <a:lnRef idx="1">
+            <a:schemeClr val="accent1"/>
+          </a:lnRef>
+          <a:fillRef idx="0">
+            <a:schemeClr val="accent1"/>
+          </a:fillRef>
+          <a:effectRef idx="0">
+            <a:schemeClr val="accent1"/>
+          </a:effectRef>
+          <a:fontRef idx="minor">
+            <a:schemeClr val="tx1"/>
+          </a:fontRef>
+        </p:style>
+      </p:cxnSp>
+      <p:cxnSp>
+        <p:nvCxnSpPr>
+          <p:cNvPr id="10" name="Straight Arrow Connector 9">
+            <a:extLst>
+              <a:ext uri="{FF2B5EF4-FFF2-40B4-BE49-F238E27FC236}">
+                <a16:creationId xmlns:a16="http://schemas.microsoft.com/office/drawing/2014/main" id="{81BC5D95-8C89-A70D-45F3-1D50953726FB}"/>
+              </a:ext>
+            </a:extLst>
+          </p:cNvPr>
+          <p:cNvCxnSpPr>
+            <a:cxnSpLocks/>
+            <a:stCxn id="5" idx="3"/>
+            <a:endCxn id="4" idx="1"/>
+          </p:cNvCxnSpPr>
+          <p:nvPr/>
+        </p:nvCxnSpPr>
+        <p:spPr>
+          <a:xfrm>
+            <a:off x="3033487" y="1927272"/>
+            <a:ext cx="1436914" cy="3128"/>
+          </a:xfrm>
+          <a:prstGeom prst="straightConnector1">
+            <a:avLst/>
+          </a:prstGeom>
+          <a:ln w="76200">
+            <a:solidFill>
+              <a:schemeClr val="accent3"/>
+            </a:solidFill>
+            <a:tailEnd type="triangle"/>
+          </a:ln>
+        </p:spPr>
+        <p:style>
+          <a:lnRef idx="1">
+            <a:schemeClr val="accent1"/>
+          </a:lnRef>
+          <a:fillRef idx="0">
+            <a:schemeClr val="accent1"/>
+          </a:fillRef>
+          <a:effectRef idx="0">
+            <a:schemeClr val="accent1"/>
+          </a:effectRef>
+          <a:fontRef idx="minor">
+            <a:schemeClr val="tx1"/>
+          </a:fontRef>
+        </p:style>
+      </p:cxnSp>
+      <p:cxnSp>
+        <p:nvCxnSpPr>
+          <p:cNvPr id="15" name="Straight Arrow Connector 14">
+            <a:extLst>
+              <a:ext uri="{FF2B5EF4-FFF2-40B4-BE49-F238E27FC236}">
+                <a16:creationId xmlns:a16="http://schemas.microsoft.com/office/drawing/2014/main" id="{486A548D-7A3D-4536-E349-AEEC841E45FC}"/>
+              </a:ext>
+            </a:extLst>
+          </p:cNvPr>
+          <p:cNvCxnSpPr>
+            <a:cxnSpLocks/>
+            <a:endCxn id="4" idx="1"/>
+          </p:cNvCxnSpPr>
+          <p:nvPr/>
+        </p:nvCxnSpPr>
+        <p:spPr>
+          <a:xfrm flipV="1">
+            <a:off x="3051824" y="1930400"/>
+            <a:ext cx="1418577" cy="335027"/>
+          </a:xfrm>
+          <a:prstGeom prst="straightConnector1">
+            <a:avLst/>
+          </a:prstGeom>
+          <a:ln w="76200">
+            <a:solidFill>
+              <a:schemeClr val="accent3"/>
+            </a:solidFill>
+            <a:tailEnd type="triangle"/>
+          </a:ln>
+        </p:spPr>
+        <p:style>
+          <a:lnRef idx="1">
+            <a:schemeClr val="accent1"/>
+          </a:lnRef>
+          <a:fillRef idx="0">
+            <a:schemeClr val="accent1"/>
+          </a:fillRef>
+          <a:effectRef idx="0">
+            <a:schemeClr val="accent1"/>
+          </a:effectRef>
+          <a:fontRef idx="minor">
+            <a:schemeClr val="tx1"/>
+          </a:fontRef>
+        </p:style>
+      </p:cxnSp>
+      <p:cxnSp>
+        <p:nvCxnSpPr>
+          <p:cNvPr id="18" name="Straight Arrow Connector 17">
+            <a:extLst>
+              <a:ext uri="{FF2B5EF4-FFF2-40B4-BE49-F238E27FC236}">
+                <a16:creationId xmlns:a16="http://schemas.microsoft.com/office/drawing/2014/main" id="{76801C1F-13E7-DDC1-5B7D-421ADC2B72E0}"/>
+              </a:ext>
+            </a:extLst>
+          </p:cNvPr>
+          <p:cNvCxnSpPr>
+            <a:cxnSpLocks/>
+          </p:cNvCxnSpPr>
+          <p:nvPr/>
+        </p:nvCxnSpPr>
+        <p:spPr>
+          <a:xfrm>
+            <a:off x="7344229" y="1927272"/>
+            <a:ext cx="1117600" cy="0"/>
+          </a:xfrm>
+          <a:prstGeom prst="straightConnector1">
+            <a:avLst/>
+          </a:prstGeom>
+          <a:ln w="76200">
+            <a:solidFill>
+              <a:schemeClr val="accent3"/>
+            </a:solidFill>
+            <a:tailEnd type="triangle"/>
+          </a:ln>
+        </p:spPr>
+        <p:style>
+          <a:lnRef idx="1">
+            <a:schemeClr val="accent1"/>
+          </a:lnRef>
+          <a:fillRef idx="0">
+            <a:schemeClr val="accent1"/>
+          </a:fillRef>
+          <a:effectRef idx="0">
+            <a:schemeClr val="accent1"/>
+          </a:effectRef>
+          <a:fontRef idx="minor">
+            <a:schemeClr val="tx1"/>
+          </a:fontRef>
+        </p:style>
+      </p:cxnSp>
+      <p:sp>
+        <p:nvSpPr>
+          <p:cNvPr id="20" name="TextBox 19">
+            <a:extLst>
+              <a:ext uri="{FF2B5EF4-FFF2-40B4-BE49-F238E27FC236}">
+                <a16:creationId xmlns:a16="http://schemas.microsoft.com/office/drawing/2014/main" id="{DDD1640F-C347-1A67-CD1F-BC09CB8FE516}"/>
+              </a:ext>
+            </a:extLst>
+          </p:cNvPr>
+          <p:cNvSpPr txBox="1"/>
+          <p:nvPr/>
+        </p:nvSpPr>
+        <p:spPr>
+          <a:xfrm>
+            <a:off x="8468122" y="1756229"/>
+            <a:ext cx="1226618" cy="461665"/>
+          </a:xfrm>
+          <a:prstGeom prst="rect">
+            <a:avLst/>
+          </a:prstGeom>
+          <a:noFill/>
+        </p:spPr>
+        <p:txBody>
+          <a:bodyPr wrap="none" rtlCol="0">
+            <a:spAutoFit/>
+          </a:bodyPr>
+          <a:lstStyle/>
+          <a:p>
+            <a:r>
+              <a:rPr lang="en-US" sz="2400" b="1" dirty="0">
+                <a:solidFill>
+                  <a:schemeClr val="accent3"/>
+                </a:solidFill>
+              </a:rPr>
+              <a:t>Outputs</a:t>
+            </a:r>
+          </a:p>
+        </p:txBody>
+      </p:sp>
+      <p:sp>
+        <p:nvSpPr>
+          <p:cNvPr id="21" name="Rectangle: Rounded Corners 20">
+            <a:extLst>
+              <a:ext uri="{FF2B5EF4-FFF2-40B4-BE49-F238E27FC236}">
+                <a16:creationId xmlns:a16="http://schemas.microsoft.com/office/drawing/2014/main" id="{33170646-BB83-AFBF-6EB8-84953D8FCF35}"/>
+              </a:ext>
+            </a:extLst>
+          </p:cNvPr>
+          <p:cNvSpPr/>
+          <p:nvPr/>
+        </p:nvSpPr>
+        <p:spPr>
+          <a:xfrm>
+            <a:off x="4470401" y="3794703"/>
+            <a:ext cx="2873828" cy="1393371"/>
+          </a:xfrm>
+          <a:prstGeom prst="roundRect">
+            <a:avLst/>
+          </a:prstGeom>
+        </p:spPr>
+        <p:style>
+          <a:lnRef idx="2">
+            <a:schemeClr val="accent2">
+              <a:shade val="15000"/>
+            </a:schemeClr>
+          </a:lnRef>
+          <a:fillRef idx="1">
+            <a:schemeClr val="accent2"/>
+          </a:fillRef>
+          <a:effectRef idx="0">
+            <a:schemeClr val="accent2"/>
+          </a:effectRef>
+          <a:fontRef idx="minor">
+            <a:schemeClr val="lt1"/>
+          </a:fontRef>
+        </p:style>
+        <p:txBody>
+          <a:bodyPr rtlCol="0" anchor="ctr"/>
+          <a:lstStyle/>
+          <a:p>
+            <a:pPr algn="ctr"/>
+            <a:endParaRPr lang="en-US"/>
+          </a:p>
+        </p:txBody>
+      </p:sp>
+      <p:sp>
+        <p:nvSpPr>
+          <p:cNvPr id="22" name="TextBox 21">
+            <a:extLst>
+              <a:ext uri="{FF2B5EF4-FFF2-40B4-BE49-F238E27FC236}">
+                <a16:creationId xmlns:a16="http://schemas.microsoft.com/office/drawing/2014/main" id="{9654E92F-2E3F-4102-4D1F-BC52B54203CE}"/>
+              </a:ext>
+            </a:extLst>
+          </p:cNvPr>
+          <p:cNvSpPr txBox="1"/>
+          <p:nvPr/>
+        </p:nvSpPr>
+        <p:spPr>
+          <a:xfrm>
+            <a:off x="916118" y="3891224"/>
+            <a:ext cx="2093330" cy="1200329"/>
+          </a:xfrm>
+          <a:prstGeom prst="rect">
+            <a:avLst/>
+          </a:prstGeom>
+          <a:noFill/>
+        </p:spPr>
+        <p:txBody>
+          <a:bodyPr wrap="none" rtlCol="0">
+            <a:spAutoFit/>
+          </a:bodyPr>
+          <a:lstStyle/>
+          <a:p>
+            <a:r>
+              <a:rPr lang="en-US" sz="2400" b="1" dirty="0">
+                <a:solidFill>
+                  <a:schemeClr val="accent3"/>
+                </a:solidFill>
+              </a:rPr>
+              <a:t>Input feature 1</a:t>
+            </a:r>
+          </a:p>
+          <a:p>
+            <a:r>
+              <a:rPr lang="en-US" sz="2400" b="1" dirty="0">
+                <a:solidFill>
+                  <a:schemeClr val="accent1"/>
+                </a:solidFill>
+              </a:rPr>
+              <a:t>Input feature 2</a:t>
+            </a:r>
+          </a:p>
+          <a:p>
+            <a:r>
+              <a:rPr lang="en-US" sz="2400" b="1" dirty="0">
+                <a:solidFill>
+                  <a:schemeClr val="accent3"/>
+                </a:solidFill>
+              </a:rPr>
+              <a:t>Input feature 3</a:t>
+            </a:r>
+          </a:p>
+        </p:txBody>
+      </p:sp>
+      <p:cxnSp>
+        <p:nvCxnSpPr>
+          <p:cNvPr id="23" name="Straight Arrow Connector 22">
+            <a:extLst>
+              <a:ext uri="{FF2B5EF4-FFF2-40B4-BE49-F238E27FC236}">
+                <a16:creationId xmlns:a16="http://schemas.microsoft.com/office/drawing/2014/main" id="{5D7215C5-51BE-7378-31A0-98F1B711E79E}"/>
+              </a:ext>
+            </a:extLst>
+          </p:cNvPr>
+          <p:cNvCxnSpPr>
+            <a:cxnSpLocks/>
+            <a:endCxn id="21" idx="1"/>
+          </p:cNvCxnSpPr>
+          <p:nvPr/>
+        </p:nvCxnSpPr>
+        <p:spPr>
+          <a:xfrm>
+            <a:off x="3009448" y="4118994"/>
+            <a:ext cx="1460953" cy="372395"/>
+          </a:xfrm>
+          <a:prstGeom prst="straightConnector1">
+            <a:avLst/>
+          </a:prstGeom>
+          <a:ln w="76200">
+            <a:solidFill>
+              <a:schemeClr val="accent3"/>
+            </a:solidFill>
+            <a:tailEnd type="triangle"/>
+          </a:ln>
+        </p:spPr>
+        <p:style>
+          <a:lnRef idx="1">
+            <a:schemeClr val="accent1"/>
+          </a:lnRef>
+          <a:fillRef idx="0">
+            <a:schemeClr val="accent1"/>
+          </a:fillRef>
+          <a:effectRef idx="0">
+            <a:schemeClr val="accent1"/>
+          </a:effectRef>
+          <a:fontRef idx="minor">
+            <a:schemeClr val="tx1"/>
+          </a:fontRef>
+        </p:style>
+      </p:cxnSp>
+      <p:cxnSp>
+        <p:nvCxnSpPr>
+          <p:cNvPr id="24" name="Straight Arrow Connector 23">
+            <a:extLst>
+              <a:ext uri="{FF2B5EF4-FFF2-40B4-BE49-F238E27FC236}">
+                <a16:creationId xmlns:a16="http://schemas.microsoft.com/office/drawing/2014/main" id="{16956EAD-7FB4-D023-2000-F9A04042B6EE}"/>
+              </a:ext>
+            </a:extLst>
+          </p:cNvPr>
+          <p:cNvCxnSpPr>
+            <a:cxnSpLocks/>
+            <a:stCxn id="22" idx="3"/>
+            <a:endCxn id="21" idx="1"/>
+          </p:cNvCxnSpPr>
+          <p:nvPr/>
+        </p:nvCxnSpPr>
+        <p:spPr>
+          <a:xfrm>
+            <a:off x="3009448" y="4491389"/>
+            <a:ext cx="1460953" cy="0"/>
+          </a:xfrm>
+          <a:prstGeom prst="straightConnector1">
+            <a:avLst/>
+          </a:prstGeom>
+          <a:ln w="76200">
+            <a:solidFill>
+              <a:schemeClr val="accent3"/>
+            </a:solidFill>
+            <a:tailEnd type="triangle"/>
+          </a:ln>
+        </p:spPr>
+        <p:style>
+          <a:lnRef idx="1">
+            <a:schemeClr val="accent1"/>
+          </a:lnRef>
+          <a:fillRef idx="0">
+            <a:schemeClr val="accent1"/>
+          </a:fillRef>
+          <a:effectRef idx="0">
+            <a:schemeClr val="accent1"/>
+          </a:effectRef>
+          <a:fontRef idx="minor">
+            <a:schemeClr val="tx1"/>
+          </a:fontRef>
+        </p:style>
+      </p:cxnSp>
+      <p:cxnSp>
+        <p:nvCxnSpPr>
+          <p:cNvPr id="25" name="Straight Arrow Connector 24">
+            <a:extLst>
+              <a:ext uri="{FF2B5EF4-FFF2-40B4-BE49-F238E27FC236}">
+                <a16:creationId xmlns:a16="http://schemas.microsoft.com/office/drawing/2014/main" id="{B0D13E69-5057-4E56-755B-A8FAD9706512}"/>
+              </a:ext>
+            </a:extLst>
+          </p:cNvPr>
+          <p:cNvCxnSpPr>
+            <a:cxnSpLocks/>
+            <a:endCxn id="21" idx="1"/>
+          </p:cNvCxnSpPr>
+          <p:nvPr/>
+        </p:nvCxnSpPr>
+        <p:spPr>
+          <a:xfrm flipV="1">
+            <a:off x="3033487" y="4491389"/>
+            <a:ext cx="1436914" cy="324291"/>
+          </a:xfrm>
+          <a:prstGeom prst="straightConnector1">
+            <a:avLst/>
+          </a:prstGeom>
+          <a:ln w="76200">
+            <a:solidFill>
+              <a:schemeClr val="accent3"/>
+            </a:solidFill>
+            <a:tailEnd type="triangle"/>
+          </a:ln>
+        </p:spPr>
+        <p:style>
+          <a:lnRef idx="1">
+            <a:schemeClr val="accent1"/>
+          </a:lnRef>
+          <a:fillRef idx="0">
+            <a:schemeClr val="accent1"/>
+          </a:fillRef>
+          <a:effectRef idx="0">
+            <a:schemeClr val="accent1"/>
+          </a:effectRef>
+          <a:fontRef idx="minor">
+            <a:schemeClr val="tx1"/>
+          </a:fontRef>
+        </p:style>
+      </p:cxnSp>
+      <p:cxnSp>
+        <p:nvCxnSpPr>
+          <p:cNvPr id="26" name="Straight Arrow Connector 25">
+            <a:extLst>
+              <a:ext uri="{FF2B5EF4-FFF2-40B4-BE49-F238E27FC236}">
+                <a16:creationId xmlns:a16="http://schemas.microsoft.com/office/drawing/2014/main" id="{BFCDD201-5652-02AA-26A1-9B68EAFD25F6}"/>
+              </a:ext>
+            </a:extLst>
+          </p:cNvPr>
+          <p:cNvCxnSpPr>
+            <a:cxnSpLocks/>
+          </p:cNvCxnSpPr>
+          <p:nvPr/>
+        </p:nvCxnSpPr>
+        <p:spPr>
+          <a:xfrm>
+            <a:off x="7344229" y="4488261"/>
+            <a:ext cx="1117600" cy="0"/>
+          </a:xfrm>
+          <a:prstGeom prst="straightConnector1">
+            <a:avLst/>
+          </a:prstGeom>
+          <a:ln w="76200">
+            <a:solidFill>
+              <a:schemeClr val="accent3"/>
+            </a:solidFill>
+            <a:tailEnd type="triangle"/>
+          </a:ln>
+        </p:spPr>
+        <p:style>
+          <a:lnRef idx="1">
+            <a:schemeClr val="accent1"/>
+          </a:lnRef>
+          <a:fillRef idx="0">
+            <a:schemeClr val="accent1"/>
+          </a:fillRef>
+          <a:effectRef idx="0">
+            <a:schemeClr val="accent1"/>
+          </a:effectRef>
+          <a:fontRef idx="minor">
+            <a:schemeClr val="tx1"/>
+          </a:fontRef>
+        </p:style>
+      </p:cxnSp>
+      <p:sp>
+        <p:nvSpPr>
+          <p:cNvPr id="27" name="TextBox 26">
+            <a:extLst>
+              <a:ext uri="{FF2B5EF4-FFF2-40B4-BE49-F238E27FC236}">
+                <a16:creationId xmlns:a16="http://schemas.microsoft.com/office/drawing/2014/main" id="{E64C7C82-5083-B9D6-C825-039A99FD5339}"/>
+              </a:ext>
+            </a:extLst>
+          </p:cNvPr>
+          <p:cNvSpPr txBox="1"/>
+          <p:nvPr/>
+        </p:nvSpPr>
+        <p:spPr>
+          <a:xfrm>
+            <a:off x="8468122" y="4317218"/>
+            <a:ext cx="1226618" cy="461665"/>
+          </a:xfrm>
+          <a:prstGeom prst="rect">
+            <a:avLst/>
+          </a:prstGeom>
+          <a:noFill/>
+        </p:spPr>
+        <p:txBody>
+          <a:bodyPr wrap="none" rtlCol="0">
+            <a:spAutoFit/>
+          </a:bodyPr>
+          <a:lstStyle/>
+          <a:p>
+            <a:r>
+              <a:rPr lang="en-US" sz="2400" b="1" dirty="0">
+                <a:solidFill>
+                  <a:schemeClr val="accent3"/>
+                </a:solidFill>
+              </a:rPr>
+              <a:t>Outputs</a:t>
+            </a:r>
+          </a:p>
+        </p:txBody>
+      </p:sp>
+      <p:cxnSp>
+        <p:nvCxnSpPr>
+          <p:cNvPr id="29" name="Straight Arrow Connector 28">
+            <a:extLst>
+              <a:ext uri="{FF2B5EF4-FFF2-40B4-BE49-F238E27FC236}">
+                <a16:creationId xmlns:a16="http://schemas.microsoft.com/office/drawing/2014/main" id="{93FF8F84-5F55-0D0D-2A19-E3A8B7C371E3}"/>
+              </a:ext>
+            </a:extLst>
+          </p:cNvPr>
+          <p:cNvCxnSpPr>
+            <a:stCxn id="20" idx="2"/>
+            <a:endCxn id="27" idx="0"/>
+          </p:cNvCxnSpPr>
+          <p:nvPr/>
+        </p:nvCxnSpPr>
+        <p:spPr>
+          <a:xfrm>
+            <a:off x="9081431" y="2217894"/>
+            <a:ext cx="0" cy="2099324"/>
+          </a:xfrm>
+          <a:prstGeom prst="straightConnector1">
+            <a:avLst/>
+          </a:prstGeom>
+          <a:ln w="76200">
+            <a:solidFill>
+              <a:schemeClr val="accent3"/>
+            </a:solidFill>
+            <a:headEnd type="triangle"/>
+            <a:tailEnd type="triangle"/>
+          </a:ln>
+        </p:spPr>
+        <p:style>
+          <a:lnRef idx="1">
+            <a:schemeClr val="accent1"/>
+          </a:lnRef>
+          <a:fillRef idx="0">
+            <a:schemeClr val="accent1"/>
+          </a:fillRef>
+          <a:effectRef idx="0">
+            <a:schemeClr val="accent1"/>
+          </a:effectRef>
+          <a:fontRef idx="minor">
+            <a:schemeClr val="tx1"/>
+          </a:fontRef>
+        </p:style>
+      </p:cxnSp>
+      <p:sp>
+        <p:nvSpPr>
+          <p:cNvPr id="30" name="TextBox 29">
+            <a:extLst>
+              <a:ext uri="{FF2B5EF4-FFF2-40B4-BE49-F238E27FC236}">
+                <a16:creationId xmlns:a16="http://schemas.microsoft.com/office/drawing/2014/main" id="{339E6189-C977-5B3F-D1E8-E8EA275E1C7A}"/>
+              </a:ext>
+            </a:extLst>
+          </p:cNvPr>
+          <p:cNvSpPr txBox="1"/>
+          <p:nvPr/>
+        </p:nvSpPr>
+        <p:spPr>
+          <a:xfrm>
+            <a:off x="9063094" y="3059668"/>
+            <a:ext cx="1661224" cy="461665"/>
+          </a:xfrm>
+          <a:prstGeom prst="rect">
+            <a:avLst/>
+          </a:prstGeom>
+          <a:noFill/>
+        </p:spPr>
+        <p:txBody>
+          <a:bodyPr wrap="none" rtlCol="0">
+            <a:spAutoFit/>
+          </a:bodyPr>
+          <a:lstStyle/>
+          <a:p>
+            <a:r>
+              <a:rPr lang="en-US" sz="2400" b="1" dirty="0">
+                <a:solidFill>
+                  <a:schemeClr val="accent3"/>
+                </a:solidFill>
+              </a:rPr>
+              <a:t>Importance</a:t>
+            </a:r>
           </a:p>
         </p:txBody>
       </p:sp>
     </p:spTree>
     <p:extLst>
       <p:ext uri="{BB962C8B-B14F-4D97-AF65-F5344CB8AC3E}">
-        <p14:creationId xmlns:p14="http://schemas.microsoft.com/office/powerpoint/2010/main" val="3448161975"/>
+        <p14:creationId xmlns:p14="http://schemas.microsoft.com/office/powerpoint/2010/main" val="2940133301"/>
       </p:ext>
     </p:extLst>
   </p:cSld>
@@ -9096,61 +9088,741 @@
       </p:grpSpPr>
       <p:sp>
         <p:nvSpPr>
-          <p:cNvPr id="2" name="Title 1">
-            <a:extLst>
-              <a:ext uri="{FF2B5EF4-FFF2-40B4-BE49-F238E27FC236}">
-                <a16:creationId xmlns:a16="http://schemas.microsoft.com/office/drawing/2014/main" id="{64E52A62-04F5-AE6F-038A-7B95C6D6A1D1}"/>
-              </a:ext>
-            </a:extLst>
-          </p:cNvPr>
-          <p:cNvSpPr>
-            <a:spLocks noGrp="1"/>
-          </p:cNvSpPr>
-          <p:nvPr>
-            <p:ph type="title"/>
-          </p:nvPr>
-        </p:nvSpPr>
-        <p:spPr/>
-        <p:txBody>
-          <a:bodyPr/>
-          <a:lstStyle/>
-          <a:p>
-            <a:r>
-              <a:rPr lang="en-US" dirty="0"/>
-              <a:t>SHAP feature importance</a:t>
-            </a:r>
-          </a:p>
-        </p:txBody>
-      </p:sp>
-      <p:sp>
-        <p:nvSpPr>
-          <p:cNvPr id="3" name="Text Placeholder 2">
-            <a:extLst>
-              <a:ext uri="{FF2B5EF4-FFF2-40B4-BE49-F238E27FC236}">
-                <a16:creationId xmlns:a16="http://schemas.microsoft.com/office/drawing/2014/main" id="{500A4322-DDEA-D287-DE0B-484E36CC7DBA}"/>
-              </a:ext>
-            </a:extLst>
-          </p:cNvPr>
-          <p:cNvSpPr>
-            <a:spLocks noGrp="1"/>
-          </p:cNvSpPr>
-          <p:nvPr>
-            <p:ph type="body" idx="1"/>
-          </p:nvPr>
-        </p:nvSpPr>
-        <p:spPr/>
-        <p:txBody>
-          <a:bodyPr/>
-          <a:lstStyle/>
-          <a:p>
-            <a:endParaRPr lang="en-US" dirty="0"/>
+          <p:cNvPr id="4" name="Rectangle: Rounded Corners 3">
+            <a:extLst>
+              <a:ext uri="{FF2B5EF4-FFF2-40B4-BE49-F238E27FC236}">
+                <a16:creationId xmlns:a16="http://schemas.microsoft.com/office/drawing/2014/main" id="{1C4732B3-E9EF-7243-75B6-2021337C9271}"/>
+              </a:ext>
+            </a:extLst>
+          </p:cNvPr>
+          <p:cNvSpPr/>
+          <p:nvPr/>
+        </p:nvSpPr>
+        <p:spPr>
+          <a:xfrm>
+            <a:off x="4470401" y="1233714"/>
+            <a:ext cx="2873828" cy="1393371"/>
+          </a:xfrm>
+          <a:prstGeom prst="roundRect">
+            <a:avLst/>
+          </a:prstGeom>
+        </p:spPr>
+        <p:style>
+          <a:lnRef idx="2">
+            <a:schemeClr val="accent2">
+              <a:shade val="15000"/>
+            </a:schemeClr>
+          </a:lnRef>
+          <a:fillRef idx="1">
+            <a:schemeClr val="accent2"/>
+          </a:fillRef>
+          <a:effectRef idx="0">
+            <a:schemeClr val="accent2"/>
+          </a:effectRef>
+          <a:fontRef idx="minor">
+            <a:schemeClr val="lt1"/>
+          </a:fontRef>
+        </p:style>
+        <p:txBody>
+          <a:bodyPr rtlCol="0" anchor="ctr"/>
+          <a:lstStyle/>
+          <a:p>
+            <a:pPr algn="ctr"/>
+            <a:endParaRPr lang="en-US"/>
+          </a:p>
+        </p:txBody>
+      </p:sp>
+      <p:sp>
+        <p:nvSpPr>
+          <p:cNvPr id="5" name="TextBox 4">
+            <a:extLst>
+              <a:ext uri="{FF2B5EF4-FFF2-40B4-BE49-F238E27FC236}">
+                <a16:creationId xmlns:a16="http://schemas.microsoft.com/office/drawing/2014/main" id="{CFE4160B-FD48-3594-2DDA-7CDB2C91942D}"/>
+              </a:ext>
+            </a:extLst>
+          </p:cNvPr>
+          <p:cNvSpPr txBox="1"/>
+          <p:nvPr/>
+        </p:nvSpPr>
+        <p:spPr>
+          <a:xfrm>
+            <a:off x="940157" y="1327107"/>
+            <a:ext cx="2093330" cy="1200329"/>
+          </a:xfrm>
+          <a:prstGeom prst="rect">
+            <a:avLst/>
+          </a:prstGeom>
+          <a:noFill/>
+        </p:spPr>
+        <p:txBody>
+          <a:bodyPr wrap="none" rtlCol="0">
+            <a:spAutoFit/>
+          </a:bodyPr>
+          <a:lstStyle/>
+          <a:p>
+            <a:r>
+              <a:rPr lang="en-US" sz="2400" b="1" dirty="0">
+                <a:solidFill>
+                  <a:schemeClr val="accent3"/>
+                </a:solidFill>
+              </a:rPr>
+              <a:t>Input feature 1</a:t>
+            </a:r>
+          </a:p>
+          <a:p>
+            <a:r>
+              <a:rPr lang="en-US" sz="2400" b="1" dirty="0">
+                <a:solidFill>
+                  <a:schemeClr val="accent3"/>
+                </a:solidFill>
+              </a:rPr>
+              <a:t>Input feature 2</a:t>
+            </a:r>
+          </a:p>
+          <a:p>
+            <a:r>
+              <a:rPr lang="en-US" sz="2400" b="1" dirty="0">
+                <a:solidFill>
+                  <a:schemeClr val="accent3"/>
+                </a:solidFill>
+              </a:rPr>
+              <a:t>Input feature 3</a:t>
+            </a:r>
+          </a:p>
+        </p:txBody>
+      </p:sp>
+      <p:cxnSp>
+        <p:nvCxnSpPr>
+          <p:cNvPr id="6" name="Straight Arrow Connector 5">
+            <a:extLst>
+              <a:ext uri="{FF2B5EF4-FFF2-40B4-BE49-F238E27FC236}">
+                <a16:creationId xmlns:a16="http://schemas.microsoft.com/office/drawing/2014/main" id="{A959CDBA-2C23-1B9D-EE91-5721EC364A56}"/>
+              </a:ext>
+            </a:extLst>
+          </p:cNvPr>
+          <p:cNvCxnSpPr>
+            <a:cxnSpLocks/>
+            <a:endCxn id="4" idx="1"/>
+          </p:cNvCxnSpPr>
+          <p:nvPr/>
+        </p:nvCxnSpPr>
+        <p:spPr>
+          <a:xfrm>
+            <a:off x="3009448" y="1568741"/>
+            <a:ext cx="1460953" cy="361659"/>
+          </a:xfrm>
+          <a:prstGeom prst="straightConnector1">
+            <a:avLst/>
+          </a:prstGeom>
+          <a:ln w="76200">
+            <a:solidFill>
+              <a:schemeClr val="accent3"/>
+            </a:solidFill>
+            <a:tailEnd type="triangle"/>
+          </a:ln>
+        </p:spPr>
+        <p:style>
+          <a:lnRef idx="1">
+            <a:schemeClr val="accent1"/>
+          </a:lnRef>
+          <a:fillRef idx="0">
+            <a:schemeClr val="accent1"/>
+          </a:fillRef>
+          <a:effectRef idx="0">
+            <a:schemeClr val="accent1"/>
+          </a:effectRef>
+          <a:fontRef idx="minor">
+            <a:schemeClr val="tx1"/>
+          </a:fontRef>
+        </p:style>
+      </p:cxnSp>
+      <p:cxnSp>
+        <p:nvCxnSpPr>
+          <p:cNvPr id="10" name="Straight Arrow Connector 9">
+            <a:extLst>
+              <a:ext uri="{FF2B5EF4-FFF2-40B4-BE49-F238E27FC236}">
+                <a16:creationId xmlns:a16="http://schemas.microsoft.com/office/drawing/2014/main" id="{81BC5D95-8C89-A70D-45F3-1D50953726FB}"/>
+              </a:ext>
+            </a:extLst>
+          </p:cNvPr>
+          <p:cNvCxnSpPr>
+            <a:cxnSpLocks/>
+            <a:stCxn id="5" idx="3"/>
+            <a:endCxn id="4" idx="1"/>
+          </p:cNvCxnSpPr>
+          <p:nvPr/>
+        </p:nvCxnSpPr>
+        <p:spPr>
+          <a:xfrm>
+            <a:off x="3033487" y="1927272"/>
+            <a:ext cx="1436914" cy="3128"/>
+          </a:xfrm>
+          <a:prstGeom prst="straightConnector1">
+            <a:avLst/>
+          </a:prstGeom>
+          <a:ln w="76200">
+            <a:solidFill>
+              <a:schemeClr val="accent3"/>
+            </a:solidFill>
+            <a:tailEnd type="triangle"/>
+          </a:ln>
+        </p:spPr>
+        <p:style>
+          <a:lnRef idx="1">
+            <a:schemeClr val="accent1"/>
+          </a:lnRef>
+          <a:fillRef idx="0">
+            <a:schemeClr val="accent1"/>
+          </a:fillRef>
+          <a:effectRef idx="0">
+            <a:schemeClr val="accent1"/>
+          </a:effectRef>
+          <a:fontRef idx="minor">
+            <a:schemeClr val="tx1"/>
+          </a:fontRef>
+        </p:style>
+      </p:cxnSp>
+      <p:cxnSp>
+        <p:nvCxnSpPr>
+          <p:cNvPr id="15" name="Straight Arrow Connector 14">
+            <a:extLst>
+              <a:ext uri="{FF2B5EF4-FFF2-40B4-BE49-F238E27FC236}">
+                <a16:creationId xmlns:a16="http://schemas.microsoft.com/office/drawing/2014/main" id="{486A548D-7A3D-4536-E349-AEEC841E45FC}"/>
+              </a:ext>
+            </a:extLst>
+          </p:cNvPr>
+          <p:cNvCxnSpPr>
+            <a:cxnSpLocks/>
+            <a:endCxn id="4" idx="1"/>
+          </p:cNvCxnSpPr>
+          <p:nvPr/>
+        </p:nvCxnSpPr>
+        <p:spPr>
+          <a:xfrm flipV="1">
+            <a:off x="3051824" y="1930400"/>
+            <a:ext cx="1418577" cy="335027"/>
+          </a:xfrm>
+          <a:prstGeom prst="straightConnector1">
+            <a:avLst/>
+          </a:prstGeom>
+          <a:ln w="76200">
+            <a:solidFill>
+              <a:schemeClr val="accent3"/>
+            </a:solidFill>
+            <a:tailEnd type="triangle"/>
+          </a:ln>
+        </p:spPr>
+        <p:style>
+          <a:lnRef idx="1">
+            <a:schemeClr val="accent1"/>
+          </a:lnRef>
+          <a:fillRef idx="0">
+            <a:schemeClr val="accent1"/>
+          </a:fillRef>
+          <a:effectRef idx="0">
+            <a:schemeClr val="accent1"/>
+          </a:effectRef>
+          <a:fontRef idx="minor">
+            <a:schemeClr val="tx1"/>
+          </a:fontRef>
+        </p:style>
+      </p:cxnSp>
+      <p:cxnSp>
+        <p:nvCxnSpPr>
+          <p:cNvPr id="18" name="Straight Arrow Connector 17">
+            <a:extLst>
+              <a:ext uri="{FF2B5EF4-FFF2-40B4-BE49-F238E27FC236}">
+                <a16:creationId xmlns:a16="http://schemas.microsoft.com/office/drawing/2014/main" id="{76801C1F-13E7-DDC1-5B7D-421ADC2B72E0}"/>
+              </a:ext>
+            </a:extLst>
+          </p:cNvPr>
+          <p:cNvCxnSpPr>
+            <a:cxnSpLocks/>
+          </p:cNvCxnSpPr>
+          <p:nvPr/>
+        </p:nvCxnSpPr>
+        <p:spPr>
+          <a:xfrm>
+            <a:off x="7344229" y="1927272"/>
+            <a:ext cx="1117600" cy="0"/>
+          </a:xfrm>
+          <a:prstGeom prst="straightConnector1">
+            <a:avLst/>
+          </a:prstGeom>
+          <a:ln w="76200">
+            <a:solidFill>
+              <a:schemeClr val="accent3"/>
+            </a:solidFill>
+            <a:tailEnd type="triangle"/>
+          </a:ln>
+        </p:spPr>
+        <p:style>
+          <a:lnRef idx="1">
+            <a:schemeClr val="accent1"/>
+          </a:lnRef>
+          <a:fillRef idx="0">
+            <a:schemeClr val="accent1"/>
+          </a:fillRef>
+          <a:effectRef idx="0">
+            <a:schemeClr val="accent1"/>
+          </a:effectRef>
+          <a:fontRef idx="minor">
+            <a:schemeClr val="tx1"/>
+          </a:fontRef>
+        </p:style>
+      </p:cxnSp>
+      <p:sp>
+        <p:nvSpPr>
+          <p:cNvPr id="20" name="TextBox 19">
+            <a:extLst>
+              <a:ext uri="{FF2B5EF4-FFF2-40B4-BE49-F238E27FC236}">
+                <a16:creationId xmlns:a16="http://schemas.microsoft.com/office/drawing/2014/main" id="{DDD1640F-C347-1A67-CD1F-BC09CB8FE516}"/>
+              </a:ext>
+            </a:extLst>
+          </p:cNvPr>
+          <p:cNvSpPr txBox="1"/>
+          <p:nvPr/>
+        </p:nvSpPr>
+        <p:spPr>
+          <a:xfrm>
+            <a:off x="8468122" y="1756229"/>
+            <a:ext cx="1226618" cy="461665"/>
+          </a:xfrm>
+          <a:prstGeom prst="rect">
+            <a:avLst/>
+          </a:prstGeom>
+          <a:noFill/>
+        </p:spPr>
+        <p:txBody>
+          <a:bodyPr wrap="none" rtlCol="0">
+            <a:spAutoFit/>
+          </a:bodyPr>
+          <a:lstStyle/>
+          <a:p>
+            <a:r>
+              <a:rPr lang="en-US" sz="2400" b="1" dirty="0">
+                <a:solidFill>
+                  <a:schemeClr val="accent3"/>
+                </a:solidFill>
+              </a:rPr>
+              <a:t>Outputs</a:t>
+            </a:r>
+          </a:p>
+        </p:txBody>
+      </p:sp>
+      <p:sp>
+        <p:nvSpPr>
+          <p:cNvPr id="21" name="Rectangle: Rounded Corners 20">
+            <a:extLst>
+              <a:ext uri="{FF2B5EF4-FFF2-40B4-BE49-F238E27FC236}">
+                <a16:creationId xmlns:a16="http://schemas.microsoft.com/office/drawing/2014/main" id="{33170646-BB83-AFBF-6EB8-84953D8FCF35}"/>
+              </a:ext>
+            </a:extLst>
+          </p:cNvPr>
+          <p:cNvSpPr/>
+          <p:nvPr/>
+        </p:nvSpPr>
+        <p:spPr>
+          <a:xfrm>
+            <a:off x="4470401" y="3794703"/>
+            <a:ext cx="2873828" cy="1393371"/>
+          </a:xfrm>
+          <a:prstGeom prst="roundRect">
+            <a:avLst/>
+          </a:prstGeom>
+        </p:spPr>
+        <p:style>
+          <a:lnRef idx="2">
+            <a:schemeClr val="accent2">
+              <a:shade val="15000"/>
+            </a:schemeClr>
+          </a:lnRef>
+          <a:fillRef idx="1">
+            <a:schemeClr val="accent2"/>
+          </a:fillRef>
+          <a:effectRef idx="0">
+            <a:schemeClr val="accent2"/>
+          </a:effectRef>
+          <a:fontRef idx="minor">
+            <a:schemeClr val="lt1"/>
+          </a:fontRef>
+        </p:style>
+        <p:txBody>
+          <a:bodyPr rtlCol="0" anchor="ctr"/>
+          <a:lstStyle/>
+          <a:p>
+            <a:pPr algn="ctr"/>
+            <a:endParaRPr lang="en-US"/>
+          </a:p>
+        </p:txBody>
+      </p:sp>
+      <p:sp>
+        <p:nvSpPr>
+          <p:cNvPr id="22" name="TextBox 21">
+            <a:extLst>
+              <a:ext uri="{FF2B5EF4-FFF2-40B4-BE49-F238E27FC236}">
+                <a16:creationId xmlns:a16="http://schemas.microsoft.com/office/drawing/2014/main" id="{9654E92F-2E3F-4102-4D1F-BC52B54203CE}"/>
+              </a:ext>
+            </a:extLst>
+          </p:cNvPr>
+          <p:cNvSpPr txBox="1"/>
+          <p:nvPr/>
+        </p:nvSpPr>
+        <p:spPr>
+          <a:xfrm>
+            <a:off x="916118" y="3891224"/>
+            <a:ext cx="2093330" cy="1200329"/>
+          </a:xfrm>
+          <a:prstGeom prst="rect">
+            <a:avLst/>
+          </a:prstGeom>
+          <a:noFill/>
+        </p:spPr>
+        <p:txBody>
+          <a:bodyPr wrap="none" rtlCol="0">
+            <a:spAutoFit/>
+          </a:bodyPr>
+          <a:lstStyle/>
+          <a:p>
+            <a:r>
+              <a:rPr lang="en-US" sz="2400" b="1" dirty="0">
+                <a:solidFill>
+                  <a:schemeClr val="accent3"/>
+                </a:solidFill>
+              </a:rPr>
+              <a:t>Input feature 1</a:t>
+            </a:r>
+          </a:p>
+          <a:p>
+            <a:r>
+              <a:rPr lang="en-US" sz="2400" b="1" dirty="0">
+                <a:solidFill>
+                  <a:schemeClr val="accent3"/>
+                </a:solidFill>
+              </a:rPr>
+              <a:t>Input feature 2</a:t>
+            </a:r>
+          </a:p>
+          <a:p>
+            <a:r>
+              <a:rPr lang="en-US" sz="2400" b="1" dirty="0">
+                <a:solidFill>
+                  <a:schemeClr val="accent1"/>
+                </a:solidFill>
+              </a:rPr>
+              <a:t>Input feature 3</a:t>
+            </a:r>
+          </a:p>
+        </p:txBody>
+      </p:sp>
+      <p:cxnSp>
+        <p:nvCxnSpPr>
+          <p:cNvPr id="23" name="Straight Arrow Connector 22">
+            <a:extLst>
+              <a:ext uri="{FF2B5EF4-FFF2-40B4-BE49-F238E27FC236}">
+                <a16:creationId xmlns:a16="http://schemas.microsoft.com/office/drawing/2014/main" id="{5D7215C5-51BE-7378-31A0-98F1B711E79E}"/>
+              </a:ext>
+            </a:extLst>
+          </p:cNvPr>
+          <p:cNvCxnSpPr>
+            <a:cxnSpLocks/>
+            <a:endCxn id="21" idx="1"/>
+          </p:cNvCxnSpPr>
+          <p:nvPr/>
+        </p:nvCxnSpPr>
+        <p:spPr>
+          <a:xfrm>
+            <a:off x="3009448" y="4118994"/>
+            <a:ext cx="1460953" cy="372395"/>
+          </a:xfrm>
+          <a:prstGeom prst="straightConnector1">
+            <a:avLst/>
+          </a:prstGeom>
+          <a:ln w="76200">
+            <a:solidFill>
+              <a:schemeClr val="accent3"/>
+            </a:solidFill>
+            <a:tailEnd type="triangle"/>
+          </a:ln>
+        </p:spPr>
+        <p:style>
+          <a:lnRef idx="1">
+            <a:schemeClr val="accent1"/>
+          </a:lnRef>
+          <a:fillRef idx="0">
+            <a:schemeClr val="accent1"/>
+          </a:fillRef>
+          <a:effectRef idx="0">
+            <a:schemeClr val="accent1"/>
+          </a:effectRef>
+          <a:fontRef idx="minor">
+            <a:schemeClr val="tx1"/>
+          </a:fontRef>
+        </p:style>
+      </p:cxnSp>
+      <p:cxnSp>
+        <p:nvCxnSpPr>
+          <p:cNvPr id="24" name="Straight Arrow Connector 23">
+            <a:extLst>
+              <a:ext uri="{FF2B5EF4-FFF2-40B4-BE49-F238E27FC236}">
+                <a16:creationId xmlns:a16="http://schemas.microsoft.com/office/drawing/2014/main" id="{16956EAD-7FB4-D023-2000-F9A04042B6EE}"/>
+              </a:ext>
+            </a:extLst>
+          </p:cNvPr>
+          <p:cNvCxnSpPr>
+            <a:cxnSpLocks/>
+            <a:stCxn id="22" idx="3"/>
+            <a:endCxn id="21" idx="1"/>
+          </p:cNvCxnSpPr>
+          <p:nvPr/>
+        </p:nvCxnSpPr>
+        <p:spPr>
+          <a:xfrm>
+            <a:off x="3009448" y="4491389"/>
+            <a:ext cx="1460953" cy="0"/>
+          </a:xfrm>
+          <a:prstGeom prst="straightConnector1">
+            <a:avLst/>
+          </a:prstGeom>
+          <a:ln w="76200">
+            <a:solidFill>
+              <a:schemeClr val="accent3"/>
+            </a:solidFill>
+            <a:tailEnd type="triangle"/>
+          </a:ln>
+        </p:spPr>
+        <p:style>
+          <a:lnRef idx="1">
+            <a:schemeClr val="accent1"/>
+          </a:lnRef>
+          <a:fillRef idx="0">
+            <a:schemeClr val="accent1"/>
+          </a:fillRef>
+          <a:effectRef idx="0">
+            <a:schemeClr val="accent1"/>
+          </a:effectRef>
+          <a:fontRef idx="minor">
+            <a:schemeClr val="tx1"/>
+          </a:fontRef>
+        </p:style>
+      </p:cxnSp>
+      <p:cxnSp>
+        <p:nvCxnSpPr>
+          <p:cNvPr id="25" name="Straight Arrow Connector 24">
+            <a:extLst>
+              <a:ext uri="{FF2B5EF4-FFF2-40B4-BE49-F238E27FC236}">
+                <a16:creationId xmlns:a16="http://schemas.microsoft.com/office/drawing/2014/main" id="{B0D13E69-5057-4E56-755B-A8FAD9706512}"/>
+              </a:ext>
+            </a:extLst>
+          </p:cNvPr>
+          <p:cNvCxnSpPr>
+            <a:cxnSpLocks/>
+            <a:endCxn id="21" idx="1"/>
+          </p:cNvCxnSpPr>
+          <p:nvPr/>
+        </p:nvCxnSpPr>
+        <p:spPr>
+          <a:xfrm flipV="1">
+            <a:off x="3033487" y="4491389"/>
+            <a:ext cx="1436914" cy="324291"/>
+          </a:xfrm>
+          <a:prstGeom prst="straightConnector1">
+            <a:avLst/>
+          </a:prstGeom>
+          <a:ln w="76200">
+            <a:solidFill>
+              <a:schemeClr val="accent3"/>
+            </a:solidFill>
+            <a:tailEnd type="triangle"/>
+          </a:ln>
+        </p:spPr>
+        <p:style>
+          <a:lnRef idx="1">
+            <a:schemeClr val="accent1"/>
+          </a:lnRef>
+          <a:fillRef idx="0">
+            <a:schemeClr val="accent1"/>
+          </a:fillRef>
+          <a:effectRef idx="0">
+            <a:schemeClr val="accent1"/>
+          </a:effectRef>
+          <a:fontRef idx="minor">
+            <a:schemeClr val="tx1"/>
+          </a:fontRef>
+        </p:style>
+      </p:cxnSp>
+      <p:cxnSp>
+        <p:nvCxnSpPr>
+          <p:cNvPr id="26" name="Straight Arrow Connector 25">
+            <a:extLst>
+              <a:ext uri="{FF2B5EF4-FFF2-40B4-BE49-F238E27FC236}">
+                <a16:creationId xmlns:a16="http://schemas.microsoft.com/office/drawing/2014/main" id="{BFCDD201-5652-02AA-26A1-9B68EAFD25F6}"/>
+              </a:ext>
+            </a:extLst>
+          </p:cNvPr>
+          <p:cNvCxnSpPr>
+            <a:cxnSpLocks/>
+          </p:cNvCxnSpPr>
+          <p:nvPr/>
+        </p:nvCxnSpPr>
+        <p:spPr>
+          <a:xfrm>
+            <a:off x="7344229" y="4488261"/>
+            <a:ext cx="1117600" cy="0"/>
+          </a:xfrm>
+          <a:prstGeom prst="straightConnector1">
+            <a:avLst/>
+          </a:prstGeom>
+          <a:ln w="76200">
+            <a:solidFill>
+              <a:schemeClr val="accent3"/>
+            </a:solidFill>
+            <a:tailEnd type="triangle"/>
+          </a:ln>
+        </p:spPr>
+        <p:style>
+          <a:lnRef idx="1">
+            <a:schemeClr val="accent1"/>
+          </a:lnRef>
+          <a:fillRef idx="0">
+            <a:schemeClr val="accent1"/>
+          </a:fillRef>
+          <a:effectRef idx="0">
+            <a:schemeClr val="accent1"/>
+          </a:effectRef>
+          <a:fontRef idx="minor">
+            <a:schemeClr val="tx1"/>
+          </a:fontRef>
+        </p:style>
+      </p:cxnSp>
+      <p:sp>
+        <p:nvSpPr>
+          <p:cNvPr id="27" name="TextBox 26">
+            <a:extLst>
+              <a:ext uri="{FF2B5EF4-FFF2-40B4-BE49-F238E27FC236}">
+                <a16:creationId xmlns:a16="http://schemas.microsoft.com/office/drawing/2014/main" id="{E64C7C82-5083-B9D6-C825-039A99FD5339}"/>
+              </a:ext>
+            </a:extLst>
+          </p:cNvPr>
+          <p:cNvSpPr txBox="1"/>
+          <p:nvPr/>
+        </p:nvSpPr>
+        <p:spPr>
+          <a:xfrm>
+            <a:off x="8468122" y="4317218"/>
+            <a:ext cx="1226618" cy="461665"/>
+          </a:xfrm>
+          <a:prstGeom prst="rect">
+            <a:avLst/>
+          </a:prstGeom>
+          <a:noFill/>
+        </p:spPr>
+        <p:txBody>
+          <a:bodyPr wrap="none" rtlCol="0">
+            <a:spAutoFit/>
+          </a:bodyPr>
+          <a:lstStyle/>
+          <a:p>
+            <a:r>
+              <a:rPr lang="en-US" sz="2400" b="1" dirty="0">
+                <a:solidFill>
+                  <a:schemeClr val="accent3"/>
+                </a:solidFill>
+              </a:rPr>
+              <a:t>Outputs</a:t>
+            </a:r>
+          </a:p>
+        </p:txBody>
+      </p:sp>
+      <p:cxnSp>
+        <p:nvCxnSpPr>
+          <p:cNvPr id="29" name="Straight Arrow Connector 28">
+            <a:extLst>
+              <a:ext uri="{FF2B5EF4-FFF2-40B4-BE49-F238E27FC236}">
+                <a16:creationId xmlns:a16="http://schemas.microsoft.com/office/drawing/2014/main" id="{93FF8F84-5F55-0D0D-2A19-E3A8B7C371E3}"/>
+              </a:ext>
+            </a:extLst>
+          </p:cNvPr>
+          <p:cNvCxnSpPr>
+            <a:stCxn id="20" idx="2"/>
+            <a:endCxn id="27" idx="0"/>
+          </p:cNvCxnSpPr>
+          <p:nvPr/>
+        </p:nvCxnSpPr>
+        <p:spPr>
+          <a:xfrm>
+            <a:off x="9081431" y="2217894"/>
+            <a:ext cx="0" cy="2099324"/>
+          </a:xfrm>
+          <a:prstGeom prst="straightConnector1">
+            <a:avLst/>
+          </a:prstGeom>
+          <a:ln w="76200">
+            <a:solidFill>
+              <a:schemeClr val="accent3"/>
+            </a:solidFill>
+            <a:headEnd type="triangle"/>
+            <a:tailEnd type="triangle"/>
+          </a:ln>
+        </p:spPr>
+        <p:style>
+          <a:lnRef idx="1">
+            <a:schemeClr val="accent1"/>
+          </a:lnRef>
+          <a:fillRef idx="0">
+            <a:schemeClr val="accent1"/>
+          </a:fillRef>
+          <a:effectRef idx="0">
+            <a:schemeClr val="accent1"/>
+          </a:effectRef>
+          <a:fontRef idx="minor">
+            <a:schemeClr val="tx1"/>
+          </a:fontRef>
+        </p:style>
+      </p:cxnSp>
+      <p:sp>
+        <p:nvSpPr>
+          <p:cNvPr id="30" name="TextBox 29">
+            <a:extLst>
+              <a:ext uri="{FF2B5EF4-FFF2-40B4-BE49-F238E27FC236}">
+                <a16:creationId xmlns:a16="http://schemas.microsoft.com/office/drawing/2014/main" id="{339E6189-C977-5B3F-D1E8-E8EA275E1C7A}"/>
+              </a:ext>
+            </a:extLst>
+          </p:cNvPr>
+          <p:cNvSpPr txBox="1"/>
+          <p:nvPr/>
+        </p:nvSpPr>
+        <p:spPr>
+          <a:xfrm>
+            <a:off x="9063094" y="3059668"/>
+            <a:ext cx="1661224" cy="461665"/>
+          </a:xfrm>
+          <a:prstGeom prst="rect">
+            <a:avLst/>
+          </a:prstGeom>
+          <a:noFill/>
+        </p:spPr>
+        <p:txBody>
+          <a:bodyPr wrap="none" rtlCol="0">
+            <a:spAutoFit/>
+          </a:bodyPr>
+          <a:lstStyle/>
+          <a:p>
+            <a:r>
+              <a:rPr lang="en-US" sz="2400" b="1" dirty="0">
+                <a:solidFill>
+                  <a:schemeClr val="accent3"/>
+                </a:solidFill>
+              </a:rPr>
+              <a:t>Importance</a:t>
+            </a:r>
           </a:p>
         </p:txBody>
       </p:sp>
     </p:spTree>
     <p:extLst>
       <p:ext uri="{BB962C8B-B14F-4D97-AF65-F5344CB8AC3E}">
-        <p14:creationId xmlns:p14="http://schemas.microsoft.com/office/powerpoint/2010/main" val="3071877336"/>
+        <p14:creationId xmlns:p14="http://schemas.microsoft.com/office/powerpoint/2010/main" val="2202756656"/>
       </p:ext>
     </p:extLst>
   </p:cSld>
@@ -9182,7 +9854,7 @@
           <p:cNvPr id="2" name="Title 1">
             <a:extLst>
               <a:ext uri="{FF2B5EF4-FFF2-40B4-BE49-F238E27FC236}">
-                <a16:creationId xmlns:a16="http://schemas.microsoft.com/office/drawing/2014/main" id="{64E52A62-04F5-AE6F-038A-7B95C6D6A1D1}"/>
+                <a16:creationId xmlns:a16="http://schemas.microsoft.com/office/drawing/2014/main" id="{FD70D665-2CC3-80BC-D445-5567F8747D5B}"/>
               </a:ext>
             </a:extLst>
           </p:cNvPr>
@@ -9195,22 +9867,24 @@
         </p:nvSpPr>
         <p:spPr/>
         <p:txBody>
-          <a:bodyPr/>
+          <a:bodyPr>
+            <a:normAutofit fontScale="90000"/>
+          </a:bodyPr>
           <a:lstStyle/>
           <a:p>
             <a:r>
               <a:rPr lang="en-US" dirty="0"/>
-              <a:t>Input feature correlation</a:t>
-            </a:r>
-          </a:p>
-        </p:txBody>
-      </p:sp>
-      <p:sp>
-        <p:nvSpPr>
-          <p:cNvPr id="3" name="Text Placeholder 2">
-            <a:extLst>
-              <a:ext uri="{FF2B5EF4-FFF2-40B4-BE49-F238E27FC236}">
-                <a16:creationId xmlns:a16="http://schemas.microsoft.com/office/drawing/2014/main" id="{500A4322-DDEA-D287-DE0B-484E36CC7DBA}"/>
+              <a:t>Permutation feature importance</a:t>
+            </a:r>
+          </a:p>
+        </p:txBody>
+      </p:sp>
+      <p:sp>
+        <p:nvSpPr>
+          <p:cNvPr id="3" name="Content Placeholder 2">
+            <a:extLst>
+              <a:ext uri="{FF2B5EF4-FFF2-40B4-BE49-F238E27FC236}">
+                <a16:creationId xmlns:a16="http://schemas.microsoft.com/office/drawing/2014/main" id="{205F080B-E378-39CD-56EC-381878F536CE}"/>
               </a:ext>
             </a:extLst>
           </p:cNvPr>
@@ -9218,13 +9892,40 @@
             <a:spLocks noGrp="1"/>
           </p:cNvSpPr>
           <p:nvPr>
-            <p:ph type="body" idx="1"/>
+            <p:ph idx="1"/>
           </p:nvPr>
         </p:nvSpPr>
         <p:spPr/>
         <p:txBody>
           <a:bodyPr/>
           <a:lstStyle/>
+          <a:p>
+            <a:r>
+              <a:rPr lang="en-US" dirty="0"/>
+              <a:t>Difference in model output after permutation of input features</a:t>
+            </a:r>
+          </a:p>
+          <a:p>
+            <a:endParaRPr lang="en-US" dirty="0"/>
+          </a:p>
+          <a:p>
+            <a:pPr marL="0" indent="0">
+              <a:buNone/>
+            </a:pPr>
+            <a:r>
+              <a:rPr lang="en-US" dirty="0"/>
+              <a:t>+ Applicable to all models	- Slow</a:t>
+            </a:r>
+          </a:p>
+          <a:p>
+            <a:pPr marL="0" indent="0">
+              <a:buNone/>
+            </a:pPr>
+            <a:r>
+              <a:rPr lang="en-US" dirty="0"/>
+              <a:t>					-  Limited accounting for 			   				    complex non-linear interactions</a:t>
+            </a:r>
+          </a:p>
           <a:p>
             <a:endParaRPr lang="en-US" dirty="0"/>
           </a:p>
@@ -9233,7 +9934,7 @@
     </p:spTree>
     <p:extLst>
       <p:ext uri="{BB962C8B-B14F-4D97-AF65-F5344CB8AC3E}">
-        <p14:creationId xmlns:p14="http://schemas.microsoft.com/office/powerpoint/2010/main" val="3483021838"/>
+        <p14:creationId xmlns:p14="http://schemas.microsoft.com/office/powerpoint/2010/main" val="1246877542"/>
       </p:ext>
     </p:extLst>
   </p:cSld>
@@ -9265,6 +9966,825 @@
           <p:cNvPr id="2" name="Title 1">
             <a:extLst>
               <a:ext uri="{FF2B5EF4-FFF2-40B4-BE49-F238E27FC236}">
+                <a16:creationId xmlns:a16="http://schemas.microsoft.com/office/drawing/2014/main" id="{64E52A62-04F5-AE6F-038A-7B95C6D6A1D1}"/>
+              </a:ext>
+            </a:extLst>
+          </p:cNvPr>
+          <p:cNvSpPr>
+            <a:spLocks noGrp="1"/>
+          </p:cNvSpPr>
+          <p:nvPr>
+            <p:ph type="title"/>
+          </p:nvPr>
+        </p:nvSpPr>
+        <p:spPr/>
+        <p:txBody>
+          <a:bodyPr/>
+          <a:lstStyle/>
+          <a:p>
+            <a:r>
+              <a:rPr lang="en-US" dirty="0"/>
+              <a:t>SHAP feature importance</a:t>
+            </a:r>
+          </a:p>
+        </p:txBody>
+      </p:sp>
+      <p:sp>
+        <p:nvSpPr>
+          <p:cNvPr id="3" name="Text Placeholder 2">
+            <a:extLst>
+              <a:ext uri="{FF2B5EF4-FFF2-40B4-BE49-F238E27FC236}">
+                <a16:creationId xmlns:a16="http://schemas.microsoft.com/office/drawing/2014/main" id="{500A4322-DDEA-D287-DE0B-484E36CC7DBA}"/>
+              </a:ext>
+            </a:extLst>
+          </p:cNvPr>
+          <p:cNvSpPr>
+            <a:spLocks noGrp="1"/>
+          </p:cNvSpPr>
+          <p:nvPr>
+            <p:ph type="body" idx="1"/>
+          </p:nvPr>
+        </p:nvSpPr>
+        <p:spPr/>
+        <p:txBody>
+          <a:bodyPr/>
+          <a:lstStyle/>
+          <a:p>
+            <a:endParaRPr lang="en-US" dirty="0"/>
+          </a:p>
+        </p:txBody>
+      </p:sp>
+    </p:spTree>
+    <p:extLst>
+      <p:ext uri="{BB962C8B-B14F-4D97-AF65-F5344CB8AC3E}">
+        <p14:creationId xmlns:p14="http://schemas.microsoft.com/office/powerpoint/2010/main" val="3071877336"/>
+      </p:ext>
+    </p:extLst>
+  </p:cSld>
+  <p:clrMapOvr>
+    <a:masterClrMapping/>
+  </p:clrMapOvr>
+</p:sld>
+</file>
+
+<file path=ppt/slides/slide19.xml><?xml version="1.0" encoding="utf-8"?>
+<p:sld xmlns:a="http://schemas.openxmlformats.org/drawingml/2006/main" xmlns:r="http://schemas.openxmlformats.org/officeDocument/2006/relationships" xmlns:p="http://schemas.openxmlformats.org/presentationml/2006/main">
+  <p:cSld>
+    <p:spTree>
+      <p:nvGrpSpPr>
+        <p:cNvPr id="1" name=""/>
+        <p:cNvGrpSpPr/>
+        <p:nvPr/>
+      </p:nvGrpSpPr>
+      <p:grpSpPr>
+        <a:xfrm>
+          <a:off x="0" y="0"/>
+          <a:ext cx="0" cy="0"/>
+          <a:chOff x="0" y="0"/>
+          <a:chExt cx="0" cy="0"/>
+        </a:xfrm>
+      </p:grpSpPr>
+      <p:sp>
+        <p:nvSpPr>
+          <p:cNvPr id="2" name="Title 1">
+            <a:extLst>
+              <a:ext uri="{FF2B5EF4-FFF2-40B4-BE49-F238E27FC236}">
+                <a16:creationId xmlns:a16="http://schemas.microsoft.com/office/drawing/2014/main" id="{AAC9CF41-BD2C-7ED4-F006-96FFEE144061}"/>
+              </a:ext>
+            </a:extLst>
+          </p:cNvPr>
+          <p:cNvSpPr>
+            <a:spLocks noGrp="1"/>
+          </p:cNvSpPr>
+          <p:nvPr>
+            <p:ph type="title"/>
+          </p:nvPr>
+        </p:nvSpPr>
+        <p:spPr/>
+        <p:txBody>
+          <a:bodyPr/>
+          <a:lstStyle/>
+          <a:p>
+            <a:r>
+              <a:rPr lang="en-US" dirty="0"/>
+              <a:t>SHAP feature importance</a:t>
+            </a:r>
+          </a:p>
+        </p:txBody>
+      </p:sp>
+      <p:sp>
+        <p:nvSpPr>
+          <p:cNvPr id="3" name="Content Placeholder 2">
+            <a:extLst>
+              <a:ext uri="{FF2B5EF4-FFF2-40B4-BE49-F238E27FC236}">
+                <a16:creationId xmlns:a16="http://schemas.microsoft.com/office/drawing/2014/main" id="{67CF0B29-0954-A044-648D-566EECD8E916}"/>
+              </a:ext>
+            </a:extLst>
+          </p:cNvPr>
+          <p:cNvSpPr>
+            <a:spLocks noGrp="1"/>
+          </p:cNvSpPr>
+          <p:nvPr>
+            <p:ph idx="1"/>
+          </p:nvPr>
+        </p:nvSpPr>
+        <p:spPr/>
+        <p:txBody>
+          <a:bodyPr/>
+          <a:lstStyle/>
+          <a:p>
+            <a:r>
+              <a:rPr lang="en-US" dirty="0"/>
+              <a:t>Represents the marginal contribution of a feature’s value to the prediction averaged over all possible combinations</a:t>
+            </a:r>
+          </a:p>
+          <a:p>
+            <a:endParaRPr lang="en-US" dirty="0"/>
+          </a:p>
+          <a:p>
+            <a:endParaRPr lang="en-US" dirty="0"/>
+          </a:p>
+        </p:txBody>
+      </p:sp>
+    </p:spTree>
+    <p:extLst>
+      <p:ext uri="{BB962C8B-B14F-4D97-AF65-F5344CB8AC3E}">
+        <p14:creationId xmlns:p14="http://schemas.microsoft.com/office/powerpoint/2010/main" val="2435018752"/>
+      </p:ext>
+    </p:extLst>
+  </p:cSld>
+  <p:clrMapOvr>
+    <a:masterClrMapping/>
+  </p:clrMapOvr>
+</p:sld>
+</file>
+
+<file path=ppt/slides/slide2.xml><?xml version="1.0" encoding="utf-8"?>
+<p:sld xmlns:a="http://schemas.openxmlformats.org/drawingml/2006/main" xmlns:r="http://schemas.openxmlformats.org/officeDocument/2006/relationships" xmlns:p="http://schemas.openxmlformats.org/presentationml/2006/main">
+  <p:cSld>
+    <p:spTree>
+      <p:nvGrpSpPr>
+        <p:cNvPr id="1" name=""/>
+        <p:cNvGrpSpPr/>
+        <p:nvPr/>
+      </p:nvGrpSpPr>
+      <p:grpSpPr>
+        <a:xfrm>
+          <a:off x="0" y="0"/>
+          <a:ext cx="0" cy="0"/>
+          <a:chOff x="0" y="0"/>
+          <a:chExt cx="0" cy="0"/>
+        </a:xfrm>
+      </p:grpSpPr>
+      <p:sp>
+        <p:nvSpPr>
+          <p:cNvPr id="2" name="Title 1">
+            <a:extLst>
+              <a:ext uri="{FF2B5EF4-FFF2-40B4-BE49-F238E27FC236}">
+                <a16:creationId xmlns:a16="http://schemas.microsoft.com/office/drawing/2014/main" id="{C2A248BD-F0A8-1EC1-DB1F-9FCCDC79FBF2}"/>
+              </a:ext>
+            </a:extLst>
+          </p:cNvPr>
+          <p:cNvSpPr>
+            <a:spLocks noGrp="1"/>
+          </p:cNvSpPr>
+          <p:nvPr>
+            <p:ph type="title"/>
+          </p:nvPr>
+        </p:nvSpPr>
+        <p:spPr/>
+        <p:txBody>
+          <a:bodyPr/>
+          <a:lstStyle/>
+          <a:p>
+            <a:r>
+              <a:rPr lang="en-US" dirty="0"/>
+              <a:t>Workshop</a:t>
+            </a:r>
+          </a:p>
+        </p:txBody>
+      </p:sp>
+      <p:sp>
+        <p:nvSpPr>
+          <p:cNvPr id="3" name="Content Placeholder 2">
+            <a:extLst>
+              <a:ext uri="{FF2B5EF4-FFF2-40B4-BE49-F238E27FC236}">
+                <a16:creationId xmlns:a16="http://schemas.microsoft.com/office/drawing/2014/main" id="{BFD50D4A-3C71-6FDF-E969-32E03710F2BC}"/>
+              </a:ext>
+            </a:extLst>
+          </p:cNvPr>
+          <p:cNvSpPr>
+            <a:spLocks noGrp="1"/>
+          </p:cNvSpPr>
+          <p:nvPr>
+            <p:ph idx="1"/>
+          </p:nvPr>
+        </p:nvSpPr>
+        <p:spPr/>
+        <p:txBody>
+          <a:bodyPr>
+            <a:normAutofit/>
+          </a:bodyPr>
+          <a:lstStyle/>
+          <a:p>
+            <a:r>
+              <a:rPr lang="en-US" dirty="0"/>
+              <a:t>Three sections</a:t>
+            </a:r>
+          </a:p>
+          <a:p>
+            <a:pPr lvl="1"/>
+            <a:r>
+              <a:rPr lang="en-US" dirty="0"/>
+              <a:t>Impurity feature importance</a:t>
+            </a:r>
+          </a:p>
+          <a:p>
+            <a:pPr lvl="1"/>
+            <a:r>
+              <a:rPr lang="en-US" dirty="0"/>
+              <a:t>Permutation feature importance</a:t>
+            </a:r>
+          </a:p>
+          <a:p>
+            <a:pPr lvl="1"/>
+            <a:r>
+              <a:rPr lang="en-US" dirty="0"/>
+              <a:t>SHAP feature importance</a:t>
+            </a:r>
+          </a:p>
+          <a:p>
+            <a:endParaRPr lang="en-US" dirty="0"/>
+          </a:p>
+        </p:txBody>
+      </p:sp>
+    </p:spTree>
+    <p:extLst>
+      <p:ext uri="{BB962C8B-B14F-4D97-AF65-F5344CB8AC3E}">
+        <p14:creationId xmlns:p14="http://schemas.microsoft.com/office/powerpoint/2010/main" val="94062465"/>
+      </p:ext>
+    </p:extLst>
+  </p:cSld>
+  <p:clrMapOvr>
+    <a:masterClrMapping/>
+  </p:clrMapOvr>
+</p:sld>
+</file>
+
+<file path=ppt/slides/slide20.xml><?xml version="1.0" encoding="utf-8"?>
+<p:sld xmlns:a="http://schemas.openxmlformats.org/drawingml/2006/main" xmlns:r="http://schemas.openxmlformats.org/officeDocument/2006/relationships" xmlns:p="http://schemas.openxmlformats.org/presentationml/2006/main">
+  <p:cSld>
+    <p:spTree>
+      <p:nvGrpSpPr>
+        <p:cNvPr id="1" name=""/>
+        <p:cNvGrpSpPr/>
+        <p:nvPr/>
+      </p:nvGrpSpPr>
+      <p:grpSpPr>
+        <a:xfrm>
+          <a:off x="0" y="0"/>
+          <a:ext cx="0" cy="0"/>
+          <a:chOff x="0" y="0"/>
+          <a:chExt cx="0" cy="0"/>
+        </a:xfrm>
+      </p:grpSpPr>
+      <p:pic>
+        <p:nvPicPr>
+          <p:cNvPr id="3" name="Picture 2">
+            <a:extLst>
+              <a:ext uri="{FF2B5EF4-FFF2-40B4-BE49-F238E27FC236}">
+                <a16:creationId xmlns:a16="http://schemas.microsoft.com/office/drawing/2014/main" id="{213ED857-E14C-A793-E80A-0EF9FE9BB601}"/>
+              </a:ext>
+            </a:extLst>
+          </p:cNvPr>
+          <p:cNvPicPr>
+            <a:picLocks noChangeAspect="1"/>
+          </p:cNvPicPr>
+          <p:nvPr/>
+        </p:nvPicPr>
+        <p:blipFill>
+          <a:blip r:embed="rId2">
+            <a:extLst>
+              <a:ext uri="{28A0092B-C50C-407E-A947-70E740481C1C}">
+                <a14:useLocalDpi xmlns:a14="http://schemas.microsoft.com/office/drawing/2010/main" val="0"/>
+              </a:ext>
+            </a:extLst>
+          </a:blip>
+          <a:stretch>
+            <a:fillRect/>
+          </a:stretch>
+        </p:blipFill>
+        <p:spPr>
+          <a:xfrm>
+            <a:off x="1373975" y="1019503"/>
+            <a:ext cx="9444049" cy="4203178"/>
+          </a:xfrm>
+          <a:prstGeom prst="rect">
+            <a:avLst/>
+          </a:prstGeom>
+        </p:spPr>
+      </p:pic>
+    </p:spTree>
+    <p:extLst>
+      <p:ext uri="{BB962C8B-B14F-4D97-AF65-F5344CB8AC3E}">
+        <p14:creationId xmlns:p14="http://schemas.microsoft.com/office/powerpoint/2010/main" val="721752979"/>
+      </p:ext>
+    </p:extLst>
+  </p:cSld>
+  <p:clrMapOvr>
+    <a:masterClrMapping/>
+  </p:clrMapOvr>
+</p:sld>
+</file>
+
+<file path=ppt/slides/slide21.xml><?xml version="1.0" encoding="utf-8"?>
+<p:sld xmlns:a="http://schemas.openxmlformats.org/drawingml/2006/main" xmlns:r="http://schemas.openxmlformats.org/officeDocument/2006/relationships" xmlns:p="http://schemas.openxmlformats.org/presentationml/2006/main">
+  <p:cSld>
+    <p:spTree>
+      <p:nvGrpSpPr>
+        <p:cNvPr id="1" name=""/>
+        <p:cNvGrpSpPr/>
+        <p:nvPr/>
+      </p:nvGrpSpPr>
+      <p:grpSpPr>
+        <a:xfrm>
+          <a:off x="0" y="0"/>
+          <a:ext cx="0" cy="0"/>
+          <a:chOff x="0" y="0"/>
+          <a:chExt cx="0" cy="0"/>
+        </a:xfrm>
+      </p:grpSpPr>
+      <p:sp>
+        <p:nvSpPr>
+          <p:cNvPr id="2" name="Title 1">
+            <a:extLst>
+              <a:ext uri="{FF2B5EF4-FFF2-40B4-BE49-F238E27FC236}">
+                <a16:creationId xmlns:a16="http://schemas.microsoft.com/office/drawing/2014/main" id="{AAC9CF41-BD2C-7ED4-F006-96FFEE144061}"/>
+              </a:ext>
+            </a:extLst>
+          </p:cNvPr>
+          <p:cNvSpPr>
+            <a:spLocks noGrp="1"/>
+          </p:cNvSpPr>
+          <p:nvPr>
+            <p:ph type="title"/>
+          </p:nvPr>
+        </p:nvSpPr>
+        <p:spPr/>
+        <p:txBody>
+          <a:bodyPr/>
+          <a:lstStyle/>
+          <a:p>
+            <a:r>
+              <a:rPr lang="en-US" dirty="0"/>
+              <a:t>SHAP feature importance</a:t>
+            </a:r>
+          </a:p>
+        </p:txBody>
+      </p:sp>
+      <p:sp>
+        <p:nvSpPr>
+          <p:cNvPr id="3" name="Content Placeholder 2">
+            <a:extLst>
+              <a:ext uri="{FF2B5EF4-FFF2-40B4-BE49-F238E27FC236}">
+                <a16:creationId xmlns:a16="http://schemas.microsoft.com/office/drawing/2014/main" id="{67CF0B29-0954-A044-648D-566EECD8E916}"/>
+              </a:ext>
+            </a:extLst>
+          </p:cNvPr>
+          <p:cNvSpPr>
+            <a:spLocks noGrp="1"/>
+          </p:cNvSpPr>
+          <p:nvPr>
+            <p:ph idx="1"/>
+          </p:nvPr>
+        </p:nvSpPr>
+        <p:spPr/>
+        <p:txBody>
+          <a:bodyPr/>
+          <a:lstStyle/>
+          <a:p>
+            <a:r>
+              <a:rPr lang="en-US" dirty="0"/>
+              <a:t>Represents the marginal contribution of a feature’s value to the prediction averaged over all possible combinations</a:t>
+            </a:r>
+          </a:p>
+          <a:p>
+            <a:pPr lvl="1"/>
+            <a:r>
+              <a:rPr lang="en-US" dirty="0"/>
+              <a:t>Theoretically requires permutation of all features for every timestep</a:t>
+            </a:r>
+          </a:p>
+          <a:p>
+            <a:endParaRPr lang="en-US" dirty="0"/>
+          </a:p>
+          <a:p>
+            <a:endParaRPr lang="en-US" dirty="0"/>
+          </a:p>
+        </p:txBody>
+      </p:sp>
+    </p:spTree>
+    <p:extLst>
+      <p:ext uri="{BB962C8B-B14F-4D97-AF65-F5344CB8AC3E}">
+        <p14:creationId xmlns:p14="http://schemas.microsoft.com/office/powerpoint/2010/main" val="3745155859"/>
+      </p:ext>
+    </p:extLst>
+  </p:cSld>
+  <p:clrMapOvr>
+    <a:masterClrMapping/>
+  </p:clrMapOvr>
+</p:sld>
+</file>
+
+<file path=ppt/slides/slide22.xml><?xml version="1.0" encoding="utf-8"?>
+<p:sld xmlns:a="http://schemas.openxmlformats.org/drawingml/2006/main" xmlns:r="http://schemas.openxmlformats.org/officeDocument/2006/relationships" xmlns:p="http://schemas.openxmlformats.org/presentationml/2006/main">
+  <p:cSld>
+    <p:spTree>
+      <p:nvGrpSpPr>
+        <p:cNvPr id="1" name=""/>
+        <p:cNvGrpSpPr/>
+        <p:nvPr/>
+      </p:nvGrpSpPr>
+      <p:grpSpPr>
+        <a:xfrm>
+          <a:off x="0" y="0"/>
+          <a:ext cx="0" cy="0"/>
+          <a:chOff x="0" y="0"/>
+          <a:chExt cx="0" cy="0"/>
+        </a:xfrm>
+      </p:grpSpPr>
+      <p:sp>
+        <p:nvSpPr>
+          <p:cNvPr id="2" name="Title 1">
+            <a:extLst>
+              <a:ext uri="{FF2B5EF4-FFF2-40B4-BE49-F238E27FC236}">
+                <a16:creationId xmlns:a16="http://schemas.microsoft.com/office/drawing/2014/main" id="{AAC9CF41-BD2C-7ED4-F006-96FFEE144061}"/>
+              </a:ext>
+            </a:extLst>
+          </p:cNvPr>
+          <p:cNvSpPr>
+            <a:spLocks noGrp="1"/>
+          </p:cNvSpPr>
+          <p:nvPr>
+            <p:ph type="title"/>
+          </p:nvPr>
+        </p:nvSpPr>
+        <p:spPr/>
+        <p:txBody>
+          <a:bodyPr/>
+          <a:lstStyle/>
+          <a:p>
+            <a:r>
+              <a:rPr lang="en-US" dirty="0"/>
+              <a:t>SHAP feature importance</a:t>
+            </a:r>
+          </a:p>
+        </p:txBody>
+      </p:sp>
+      <p:sp>
+        <p:nvSpPr>
+          <p:cNvPr id="3" name="Content Placeholder 2">
+            <a:extLst>
+              <a:ext uri="{FF2B5EF4-FFF2-40B4-BE49-F238E27FC236}">
+                <a16:creationId xmlns:a16="http://schemas.microsoft.com/office/drawing/2014/main" id="{67CF0B29-0954-A044-648D-566EECD8E916}"/>
+              </a:ext>
+            </a:extLst>
+          </p:cNvPr>
+          <p:cNvSpPr>
+            <a:spLocks noGrp="1"/>
+          </p:cNvSpPr>
+          <p:nvPr>
+            <p:ph idx="1"/>
+          </p:nvPr>
+        </p:nvSpPr>
+        <p:spPr/>
+        <p:txBody>
+          <a:bodyPr/>
+          <a:lstStyle/>
+          <a:p>
+            <a:r>
+              <a:rPr lang="en-US" dirty="0"/>
+              <a:t>Represents the marginal contribution of a feature’s value to the prediction averaged over all possible combinations</a:t>
+            </a:r>
+          </a:p>
+          <a:p>
+            <a:pPr lvl="1"/>
+            <a:r>
+              <a:rPr lang="en-US" dirty="0"/>
+              <a:t>Theoretically requires permutation of all features for every timestep</a:t>
+            </a:r>
+          </a:p>
+          <a:p>
+            <a:pPr lvl="1"/>
+            <a:r>
+              <a:rPr lang="en-US" dirty="0"/>
+              <a:t>In practice only a few permutations and a generalized additive model to estimate relations</a:t>
+            </a:r>
+          </a:p>
+          <a:p>
+            <a:endParaRPr lang="en-US" dirty="0"/>
+          </a:p>
+          <a:p>
+            <a:endParaRPr lang="en-US" dirty="0"/>
+          </a:p>
+        </p:txBody>
+      </p:sp>
+    </p:spTree>
+    <p:extLst>
+      <p:ext uri="{BB962C8B-B14F-4D97-AF65-F5344CB8AC3E}">
+        <p14:creationId xmlns:p14="http://schemas.microsoft.com/office/powerpoint/2010/main" val="890304604"/>
+      </p:ext>
+    </p:extLst>
+  </p:cSld>
+  <p:clrMapOvr>
+    <a:masterClrMapping/>
+  </p:clrMapOvr>
+</p:sld>
+</file>
+
+<file path=ppt/slides/slide23.xml><?xml version="1.0" encoding="utf-8"?>
+<p:sld xmlns:a="http://schemas.openxmlformats.org/drawingml/2006/main" xmlns:r="http://schemas.openxmlformats.org/officeDocument/2006/relationships" xmlns:p="http://schemas.openxmlformats.org/presentationml/2006/main">
+  <p:cSld>
+    <p:spTree>
+      <p:nvGrpSpPr>
+        <p:cNvPr id="1" name=""/>
+        <p:cNvGrpSpPr/>
+        <p:nvPr/>
+      </p:nvGrpSpPr>
+      <p:grpSpPr>
+        <a:xfrm>
+          <a:off x="0" y="0"/>
+          <a:ext cx="0" cy="0"/>
+          <a:chOff x="0" y="0"/>
+          <a:chExt cx="0" cy="0"/>
+        </a:xfrm>
+      </p:grpSpPr>
+      <p:pic>
+        <p:nvPicPr>
+          <p:cNvPr id="3" name="Picture 2">
+            <a:extLst>
+              <a:ext uri="{FF2B5EF4-FFF2-40B4-BE49-F238E27FC236}">
+                <a16:creationId xmlns:a16="http://schemas.microsoft.com/office/drawing/2014/main" id="{FB154EAF-104D-17B1-8C67-BA4147F2FD2F}"/>
+              </a:ext>
+            </a:extLst>
+          </p:cNvPr>
+          <p:cNvPicPr>
+            <a:picLocks noChangeAspect="1"/>
+          </p:cNvPicPr>
+          <p:nvPr/>
+        </p:nvPicPr>
+        <p:blipFill>
+          <a:blip r:embed="rId2">
+            <a:extLst>
+              <a:ext uri="{28A0092B-C50C-407E-A947-70E740481C1C}">
+                <a14:useLocalDpi xmlns:a14="http://schemas.microsoft.com/office/drawing/2010/main" val="0"/>
+              </a:ext>
+            </a:extLst>
+          </a:blip>
+          <a:stretch>
+            <a:fillRect/>
+          </a:stretch>
+        </p:blipFill>
+        <p:spPr>
+          <a:xfrm>
+            <a:off x="3500855" y="839431"/>
+            <a:ext cx="5190290" cy="4749605"/>
+          </a:xfrm>
+          <a:prstGeom prst="rect">
+            <a:avLst/>
+          </a:prstGeom>
+        </p:spPr>
+      </p:pic>
+    </p:spTree>
+    <p:extLst>
+      <p:ext uri="{BB962C8B-B14F-4D97-AF65-F5344CB8AC3E}">
+        <p14:creationId xmlns:p14="http://schemas.microsoft.com/office/powerpoint/2010/main" val="2954064224"/>
+      </p:ext>
+    </p:extLst>
+  </p:cSld>
+  <p:clrMapOvr>
+    <a:masterClrMapping/>
+  </p:clrMapOvr>
+</p:sld>
+</file>
+
+<file path=ppt/slides/slide24.xml><?xml version="1.0" encoding="utf-8"?>
+<p:sld xmlns:a="http://schemas.openxmlformats.org/drawingml/2006/main" xmlns:r="http://schemas.openxmlformats.org/officeDocument/2006/relationships" xmlns:p="http://schemas.openxmlformats.org/presentationml/2006/main">
+  <p:cSld>
+    <p:spTree>
+      <p:nvGrpSpPr>
+        <p:cNvPr id="1" name=""/>
+        <p:cNvGrpSpPr/>
+        <p:nvPr/>
+      </p:nvGrpSpPr>
+      <p:grpSpPr>
+        <a:xfrm>
+          <a:off x="0" y="0"/>
+          <a:ext cx="0" cy="0"/>
+          <a:chOff x="0" y="0"/>
+          <a:chExt cx="0" cy="0"/>
+        </a:xfrm>
+      </p:grpSpPr>
+      <p:sp>
+        <p:nvSpPr>
+          <p:cNvPr id="2" name="Title 1">
+            <a:extLst>
+              <a:ext uri="{FF2B5EF4-FFF2-40B4-BE49-F238E27FC236}">
+                <a16:creationId xmlns:a16="http://schemas.microsoft.com/office/drawing/2014/main" id="{AAC9CF41-BD2C-7ED4-F006-96FFEE144061}"/>
+              </a:ext>
+            </a:extLst>
+          </p:cNvPr>
+          <p:cNvSpPr>
+            <a:spLocks noGrp="1"/>
+          </p:cNvSpPr>
+          <p:nvPr>
+            <p:ph type="title"/>
+          </p:nvPr>
+        </p:nvSpPr>
+        <p:spPr/>
+        <p:txBody>
+          <a:bodyPr/>
+          <a:lstStyle/>
+          <a:p>
+            <a:r>
+              <a:rPr lang="en-US" dirty="0"/>
+              <a:t>SHAP feature importance</a:t>
+            </a:r>
+          </a:p>
+        </p:txBody>
+      </p:sp>
+      <p:sp>
+        <p:nvSpPr>
+          <p:cNvPr id="3" name="Content Placeholder 2">
+            <a:extLst>
+              <a:ext uri="{FF2B5EF4-FFF2-40B4-BE49-F238E27FC236}">
+                <a16:creationId xmlns:a16="http://schemas.microsoft.com/office/drawing/2014/main" id="{67CF0B29-0954-A044-648D-566EECD8E916}"/>
+              </a:ext>
+            </a:extLst>
+          </p:cNvPr>
+          <p:cNvSpPr>
+            <a:spLocks noGrp="1"/>
+          </p:cNvSpPr>
+          <p:nvPr>
+            <p:ph idx="1"/>
+          </p:nvPr>
+        </p:nvSpPr>
+        <p:spPr/>
+        <p:txBody>
+          <a:bodyPr/>
+          <a:lstStyle/>
+          <a:p>
+            <a:r>
+              <a:rPr lang="en-US" dirty="0"/>
+              <a:t>Represents the marginal contribution of a feature’s value to the prediction averaged over all possible combinations</a:t>
+            </a:r>
+          </a:p>
+          <a:p>
+            <a:pPr lvl="1"/>
+            <a:r>
+              <a:rPr lang="en-US" dirty="0"/>
+              <a:t>Theoretically requires permutation of all features for every timestep</a:t>
+            </a:r>
+          </a:p>
+          <a:p>
+            <a:pPr lvl="1"/>
+            <a:r>
+              <a:rPr lang="en-US" dirty="0"/>
+              <a:t>In practice only a few permutations and a generalized additive model to estimate relations</a:t>
+            </a:r>
+          </a:p>
+          <a:p>
+            <a:endParaRPr lang="en-US" dirty="0"/>
+          </a:p>
+          <a:p>
+            <a:r>
+              <a:rPr lang="en-US" dirty="0"/>
+              <a:t>+ Applicable to all models			- Even slower</a:t>
+            </a:r>
+          </a:p>
+          <a:p>
+            <a:endParaRPr lang="en-US" dirty="0"/>
+          </a:p>
+        </p:txBody>
+      </p:sp>
+    </p:spTree>
+    <p:extLst>
+      <p:ext uri="{BB962C8B-B14F-4D97-AF65-F5344CB8AC3E}">
+        <p14:creationId xmlns:p14="http://schemas.microsoft.com/office/powerpoint/2010/main" val="667341842"/>
+      </p:ext>
+    </p:extLst>
+  </p:cSld>
+  <p:clrMapOvr>
+    <a:masterClrMapping/>
+  </p:clrMapOvr>
+</p:sld>
+</file>
+
+<file path=ppt/slides/slide25.xml><?xml version="1.0" encoding="utf-8"?>
+<p:sld xmlns:a="http://schemas.openxmlformats.org/drawingml/2006/main" xmlns:r="http://schemas.openxmlformats.org/officeDocument/2006/relationships" xmlns:p="http://schemas.openxmlformats.org/presentationml/2006/main">
+  <p:cSld>
+    <p:spTree>
+      <p:nvGrpSpPr>
+        <p:cNvPr id="1" name=""/>
+        <p:cNvGrpSpPr/>
+        <p:nvPr/>
+      </p:nvGrpSpPr>
+      <p:grpSpPr>
+        <a:xfrm>
+          <a:off x="0" y="0"/>
+          <a:ext cx="0" cy="0"/>
+          <a:chOff x="0" y="0"/>
+          <a:chExt cx="0" cy="0"/>
+        </a:xfrm>
+      </p:grpSpPr>
+      <p:sp>
+        <p:nvSpPr>
+          <p:cNvPr id="2" name="Title 1">
+            <a:extLst>
+              <a:ext uri="{FF2B5EF4-FFF2-40B4-BE49-F238E27FC236}">
+                <a16:creationId xmlns:a16="http://schemas.microsoft.com/office/drawing/2014/main" id="{64E52A62-04F5-AE6F-038A-7B95C6D6A1D1}"/>
+              </a:ext>
+            </a:extLst>
+          </p:cNvPr>
+          <p:cNvSpPr>
+            <a:spLocks noGrp="1"/>
+          </p:cNvSpPr>
+          <p:nvPr>
+            <p:ph type="title"/>
+          </p:nvPr>
+        </p:nvSpPr>
+        <p:spPr/>
+        <p:txBody>
+          <a:bodyPr/>
+          <a:lstStyle/>
+          <a:p>
+            <a:r>
+              <a:rPr lang="en-US" dirty="0"/>
+              <a:t>Input feature correlation</a:t>
+            </a:r>
+          </a:p>
+        </p:txBody>
+      </p:sp>
+      <p:sp>
+        <p:nvSpPr>
+          <p:cNvPr id="3" name="Text Placeholder 2">
+            <a:extLst>
+              <a:ext uri="{FF2B5EF4-FFF2-40B4-BE49-F238E27FC236}">
+                <a16:creationId xmlns:a16="http://schemas.microsoft.com/office/drawing/2014/main" id="{500A4322-DDEA-D287-DE0B-484E36CC7DBA}"/>
+              </a:ext>
+            </a:extLst>
+          </p:cNvPr>
+          <p:cNvSpPr>
+            <a:spLocks noGrp="1"/>
+          </p:cNvSpPr>
+          <p:nvPr>
+            <p:ph type="body" idx="1"/>
+          </p:nvPr>
+        </p:nvSpPr>
+        <p:spPr/>
+        <p:txBody>
+          <a:bodyPr/>
+          <a:lstStyle/>
+          <a:p>
+            <a:endParaRPr lang="en-US" dirty="0"/>
+          </a:p>
+        </p:txBody>
+      </p:sp>
+    </p:spTree>
+    <p:extLst>
+      <p:ext uri="{BB962C8B-B14F-4D97-AF65-F5344CB8AC3E}">
+        <p14:creationId xmlns:p14="http://schemas.microsoft.com/office/powerpoint/2010/main" val="3483021838"/>
+      </p:ext>
+    </p:extLst>
+  </p:cSld>
+  <p:clrMapOvr>
+    <a:masterClrMapping/>
+  </p:clrMapOvr>
+</p:sld>
+</file>
+
+<file path=ppt/slides/slide26.xml><?xml version="1.0" encoding="utf-8"?>
+<p:sld xmlns:a="http://schemas.openxmlformats.org/drawingml/2006/main" xmlns:r="http://schemas.openxmlformats.org/officeDocument/2006/relationships" xmlns:p="http://schemas.openxmlformats.org/presentationml/2006/main">
+  <p:cSld>
+    <p:spTree>
+      <p:nvGrpSpPr>
+        <p:cNvPr id="1" name=""/>
+        <p:cNvGrpSpPr/>
+        <p:nvPr/>
+      </p:nvGrpSpPr>
+      <p:grpSpPr>
+        <a:xfrm>
+          <a:off x="0" y="0"/>
+          <a:ext cx="0" cy="0"/>
+          <a:chOff x="0" y="0"/>
+          <a:chExt cx="0" cy="0"/>
+        </a:xfrm>
+      </p:grpSpPr>
+      <p:sp>
+        <p:nvSpPr>
+          <p:cNvPr id="2" name="Title 1">
+            <a:extLst>
+              <a:ext uri="{FF2B5EF4-FFF2-40B4-BE49-F238E27FC236}">
                 <a16:creationId xmlns:a16="http://schemas.microsoft.com/office/drawing/2014/main" id="{9991D8F5-C6B4-AB61-FED4-D7B0C915853B}"/>
               </a:ext>
             </a:extLst>
@@ -9345,7 +10865,7 @@
 </p:sld>
 </file>
 
-<file path=ppt/slides/slide19.xml><?xml version="1.0" encoding="utf-8"?>
+<file path=ppt/slides/slide27.xml><?xml version="1.0" encoding="utf-8"?>
 <p:sld xmlns:a="http://schemas.openxmlformats.org/drawingml/2006/main" xmlns:r="http://schemas.openxmlformats.org/officeDocument/2006/relationships" xmlns:p="http://schemas.openxmlformats.org/presentationml/2006/main">
   <p:cSld>
     <p:spTree>
@@ -9431,7 +10951,7 @@
 </p:sld>
 </file>
 
-<file path=ppt/slides/slide2.xml><?xml version="1.0" encoding="utf-8"?>
+<file path=ppt/slides/slide28.xml><?xml version="1.0" encoding="utf-8"?>
 <p:sld xmlns:a="http://schemas.openxmlformats.org/drawingml/2006/main" xmlns:r="http://schemas.openxmlformats.org/officeDocument/2006/relationships" xmlns:p="http://schemas.openxmlformats.org/presentationml/2006/main">
   <p:cSld>
     <p:spTree>
@@ -9453,7 +10973,7 @@
           <p:cNvPr id="2" name="Title 1">
             <a:extLst>
               <a:ext uri="{FF2B5EF4-FFF2-40B4-BE49-F238E27FC236}">
-                <a16:creationId xmlns:a16="http://schemas.microsoft.com/office/drawing/2014/main" id="{C2A248BD-F0A8-1EC1-DB1F-9FCCDC79FBF2}"/>
+                <a16:creationId xmlns:a16="http://schemas.microsoft.com/office/drawing/2014/main" id="{9991D8F5-C6B4-AB61-FED4-D7B0C915853B}"/>
               </a:ext>
             </a:extLst>
           </p:cNvPr>
@@ -9471,7 +10991,7 @@
           <a:p>
             <a:r>
               <a:rPr lang="en-US" dirty="0"/>
-              <a:t>Workshop</a:t>
+              <a:t>Input feature correlation</a:t>
             </a:r>
           </a:p>
         </p:txBody>
@@ -9481,7 +11001,7 @@
           <p:cNvPr id="3" name="Content Placeholder 2">
             <a:extLst>
               <a:ext uri="{FF2B5EF4-FFF2-40B4-BE49-F238E27FC236}">
-                <a16:creationId xmlns:a16="http://schemas.microsoft.com/office/drawing/2014/main" id="{BFD50D4A-3C71-6FDF-E969-32E03710F2BC}"/>
+                <a16:creationId xmlns:a16="http://schemas.microsoft.com/office/drawing/2014/main" id="{B074EBF1-E896-79F7-817F-7C3F746E64D1}"/>
               </a:ext>
             </a:extLst>
           </p:cNvPr>
@@ -9501,39 +11021,39 @@
           <a:p>
             <a:r>
               <a:rPr lang="en-US" dirty="0"/>
-              <a:t>Three sections</a:t>
+              <a:t>We do not know how our models handle correlated input features</a:t>
             </a:r>
           </a:p>
           <a:p>
             <a:pPr lvl="1"/>
             <a:r>
               <a:rPr lang="en-US" dirty="0"/>
-              <a:t>Impurity feature importance</a:t>
+              <a:t>Ignore one</a:t>
             </a:r>
           </a:p>
           <a:p>
             <a:pPr lvl="1"/>
             <a:r>
               <a:rPr lang="en-US" dirty="0"/>
-              <a:t>Permutation feature importance</a:t>
+              <a:t>Use both</a:t>
             </a:r>
           </a:p>
           <a:p>
             <a:pPr lvl="1"/>
+            <a:endParaRPr lang="en-US" dirty="0"/>
+          </a:p>
+          <a:p>
             <a:r>
               <a:rPr lang="en-US" dirty="0"/>
-              <a:t>SHAP feature importance</a:t>
-            </a:r>
-          </a:p>
-          <a:p>
-            <a:endParaRPr lang="en-US" dirty="0"/>
+              <a:t>This is reflected in the feature importance analysis</a:t>
+            </a:r>
           </a:p>
         </p:txBody>
       </p:sp>
     </p:spTree>
     <p:extLst>
       <p:ext uri="{BB962C8B-B14F-4D97-AF65-F5344CB8AC3E}">
-        <p14:creationId xmlns:p14="http://schemas.microsoft.com/office/powerpoint/2010/main" val="94062465"/>
+        <p14:creationId xmlns:p14="http://schemas.microsoft.com/office/powerpoint/2010/main" val="1895907047"/>
       </p:ext>
     </p:extLst>
   </p:cSld>
@@ -9543,7 +11063,7 @@
 </p:sld>
 </file>
 
-<file path=ppt/slides/slide20.xml><?xml version="1.0" encoding="utf-8"?>
+<file path=ppt/slides/slide29.xml><?xml version="1.0" encoding="utf-8"?>
 <p:sld xmlns:a="http://schemas.openxmlformats.org/drawingml/2006/main" xmlns:r="http://schemas.openxmlformats.org/officeDocument/2006/relationships" xmlns:p="http://schemas.openxmlformats.org/presentationml/2006/main">
   <p:cSld>
     <p:spTree>
@@ -9613,118 +11133,6 @@
           <a:p>
             <a:r>
               <a:rPr lang="en-US" dirty="0"/>
-              <a:t>We do not know how our models handle correlated input features</a:t>
-            </a:r>
-          </a:p>
-          <a:p>
-            <a:pPr lvl="1"/>
-            <a:r>
-              <a:rPr lang="en-US" dirty="0"/>
-              <a:t>Ignore one</a:t>
-            </a:r>
-          </a:p>
-          <a:p>
-            <a:pPr lvl="1"/>
-            <a:r>
-              <a:rPr lang="en-US" dirty="0"/>
-              <a:t>Use both</a:t>
-            </a:r>
-          </a:p>
-          <a:p>
-            <a:pPr lvl="1"/>
-            <a:endParaRPr lang="en-US" dirty="0"/>
-          </a:p>
-          <a:p>
-            <a:r>
-              <a:rPr lang="en-US" dirty="0"/>
-              <a:t>This is reflected in the feature importance analysis</a:t>
-            </a:r>
-          </a:p>
-        </p:txBody>
-      </p:sp>
-    </p:spTree>
-    <p:extLst>
-      <p:ext uri="{BB962C8B-B14F-4D97-AF65-F5344CB8AC3E}">
-        <p14:creationId xmlns:p14="http://schemas.microsoft.com/office/powerpoint/2010/main" val="1895907047"/>
-      </p:ext>
-    </p:extLst>
-  </p:cSld>
-  <p:clrMapOvr>
-    <a:masterClrMapping/>
-  </p:clrMapOvr>
-</p:sld>
-</file>
-
-<file path=ppt/slides/slide21.xml><?xml version="1.0" encoding="utf-8"?>
-<p:sld xmlns:a="http://schemas.openxmlformats.org/drawingml/2006/main" xmlns:r="http://schemas.openxmlformats.org/officeDocument/2006/relationships" xmlns:p="http://schemas.openxmlformats.org/presentationml/2006/main">
-  <p:cSld>
-    <p:spTree>
-      <p:nvGrpSpPr>
-        <p:cNvPr id="1" name=""/>
-        <p:cNvGrpSpPr/>
-        <p:nvPr/>
-      </p:nvGrpSpPr>
-      <p:grpSpPr>
-        <a:xfrm>
-          <a:off x="0" y="0"/>
-          <a:ext cx="0" cy="0"/>
-          <a:chOff x="0" y="0"/>
-          <a:chExt cx="0" cy="0"/>
-        </a:xfrm>
-      </p:grpSpPr>
-      <p:sp>
-        <p:nvSpPr>
-          <p:cNvPr id="2" name="Title 1">
-            <a:extLst>
-              <a:ext uri="{FF2B5EF4-FFF2-40B4-BE49-F238E27FC236}">
-                <a16:creationId xmlns:a16="http://schemas.microsoft.com/office/drawing/2014/main" id="{9991D8F5-C6B4-AB61-FED4-D7B0C915853B}"/>
-              </a:ext>
-            </a:extLst>
-          </p:cNvPr>
-          <p:cNvSpPr>
-            <a:spLocks noGrp="1"/>
-          </p:cNvSpPr>
-          <p:nvPr>
-            <p:ph type="title"/>
-          </p:nvPr>
-        </p:nvSpPr>
-        <p:spPr/>
-        <p:txBody>
-          <a:bodyPr/>
-          <a:lstStyle/>
-          <a:p>
-            <a:r>
-              <a:rPr lang="en-US" dirty="0"/>
-              <a:t>Input feature correlation</a:t>
-            </a:r>
-          </a:p>
-        </p:txBody>
-      </p:sp>
-      <p:sp>
-        <p:nvSpPr>
-          <p:cNvPr id="3" name="Content Placeholder 2">
-            <a:extLst>
-              <a:ext uri="{FF2B5EF4-FFF2-40B4-BE49-F238E27FC236}">
-                <a16:creationId xmlns:a16="http://schemas.microsoft.com/office/drawing/2014/main" id="{B074EBF1-E896-79F7-817F-7C3F746E64D1}"/>
-              </a:ext>
-            </a:extLst>
-          </p:cNvPr>
-          <p:cNvSpPr>
-            <a:spLocks noGrp="1"/>
-          </p:cNvSpPr>
-          <p:nvPr>
-            <p:ph idx="1"/>
-          </p:nvPr>
-        </p:nvSpPr>
-        <p:spPr/>
-        <p:txBody>
-          <a:bodyPr>
-            <a:normAutofit/>
-          </a:bodyPr>
-          <a:lstStyle/>
-          <a:p>
-            <a:r>
-              <a:rPr lang="en-US" dirty="0"/>
               <a:t>Combine correlated features</a:t>
             </a:r>
           </a:p>
@@ -9746,94 +11154,6 @@
     <p:extLst>
       <p:ext uri="{BB962C8B-B14F-4D97-AF65-F5344CB8AC3E}">
         <p14:creationId xmlns:p14="http://schemas.microsoft.com/office/powerpoint/2010/main" val="1151463960"/>
-      </p:ext>
-    </p:extLst>
-  </p:cSld>
-  <p:clrMapOvr>
-    <a:masterClrMapping/>
-  </p:clrMapOvr>
-</p:sld>
-</file>
-
-<file path=ppt/slides/slide22.xml><?xml version="1.0" encoding="utf-8"?>
-<p:sld xmlns:a="http://schemas.openxmlformats.org/drawingml/2006/main" xmlns:r="http://schemas.openxmlformats.org/officeDocument/2006/relationships" xmlns:p="http://schemas.openxmlformats.org/presentationml/2006/main">
-  <p:cSld>
-    <p:spTree>
-      <p:nvGrpSpPr>
-        <p:cNvPr id="1" name=""/>
-        <p:cNvGrpSpPr/>
-        <p:nvPr/>
-      </p:nvGrpSpPr>
-      <p:grpSpPr>
-        <a:xfrm>
-          <a:off x="0" y="0"/>
-          <a:ext cx="0" cy="0"/>
-          <a:chOff x="0" y="0"/>
-          <a:chExt cx="0" cy="0"/>
-        </a:xfrm>
-      </p:grpSpPr>
-      <p:sp>
-        <p:nvSpPr>
-          <p:cNvPr id="2" name="Title 1">
-            <a:extLst>
-              <a:ext uri="{FF2B5EF4-FFF2-40B4-BE49-F238E27FC236}">
-                <a16:creationId xmlns:a16="http://schemas.microsoft.com/office/drawing/2014/main" id="{F6D740AA-AF30-153C-0FF1-7689A68CFC15}"/>
-              </a:ext>
-            </a:extLst>
-          </p:cNvPr>
-          <p:cNvSpPr>
-            <a:spLocks noGrp="1"/>
-          </p:cNvSpPr>
-          <p:nvPr>
-            <p:ph type="ctrTitle"/>
-          </p:nvPr>
-        </p:nvSpPr>
-        <p:spPr/>
-        <p:txBody>
-          <a:bodyPr/>
-          <a:lstStyle/>
-          <a:p>
-            <a:r>
-              <a:rPr lang="en-US" dirty="0"/>
-              <a:t>Feature importance</a:t>
-            </a:r>
-          </a:p>
-        </p:txBody>
-      </p:sp>
-      <p:sp>
-        <p:nvSpPr>
-          <p:cNvPr id="3" name="Subtitle 2">
-            <a:extLst>
-              <a:ext uri="{FF2B5EF4-FFF2-40B4-BE49-F238E27FC236}">
-                <a16:creationId xmlns:a16="http://schemas.microsoft.com/office/drawing/2014/main" id="{81417E61-9830-3912-7274-773ABBEAA529}"/>
-              </a:ext>
-            </a:extLst>
-          </p:cNvPr>
-          <p:cNvSpPr>
-            <a:spLocks noGrp="1"/>
-          </p:cNvSpPr>
-          <p:nvPr>
-            <p:ph type="subTitle" idx="1"/>
-          </p:nvPr>
-        </p:nvSpPr>
-        <p:spPr/>
-        <p:txBody>
-          <a:bodyPr>
-            <a:normAutofit/>
-          </a:bodyPr>
-          <a:lstStyle/>
-          <a:p>
-            <a:r>
-              <a:rPr lang="en-US" dirty="0"/>
-              <a:t>Bram Droppers</a:t>
-            </a:r>
-          </a:p>
-        </p:txBody>
-      </p:sp>
-    </p:spTree>
-    <p:extLst>
-      <p:ext uri="{BB962C8B-B14F-4D97-AF65-F5344CB8AC3E}">
-        <p14:creationId xmlns:p14="http://schemas.microsoft.com/office/powerpoint/2010/main" val="3315299860"/>
       </p:ext>
     </p:extLst>
   </p:cSld>
@@ -9963,6 +11283,94 @@
     <p:extLst>
       <p:ext uri="{BB962C8B-B14F-4D97-AF65-F5344CB8AC3E}">
         <p14:creationId xmlns:p14="http://schemas.microsoft.com/office/powerpoint/2010/main" val="2955613027"/>
+      </p:ext>
+    </p:extLst>
+  </p:cSld>
+  <p:clrMapOvr>
+    <a:masterClrMapping/>
+  </p:clrMapOvr>
+</p:sld>
+</file>
+
+<file path=ppt/slides/slide30.xml><?xml version="1.0" encoding="utf-8"?>
+<p:sld xmlns:a="http://schemas.openxmlformats.org/drawingml/2006/main" xmlns:r="http://schemas.openxmlformats.org/officeDocument/2006/relationships" xmlns:p="http://schemas.openxmlformats.org/presentationml/2006/main">
+  <p:cSld>
+    <p:spTree>
+      <p:nvGrpSpPr>
+        <p:cNvPr id="1" name=""/>
+        <p:cNvGrpSpPr/>
+        <p:nvPr/>
+      </p:nvGrpSpPr>
+      <p:grpSpPr>
+        <a:xfrm>
+          <a:off x="0" y="0"/>
+          <a:ext cx="0" cy="0"/>
+          <a:chOff x="0" y="0"/>
+          <a:chExt cx="0" cy="0"/>
+        </a:xfrm>
+      </p:grpSpPr>
+      <p:sp>
+        <p:nvSpPr>
+          <p:cNvPr id="2" name="Title 1">
+            <a:extLst>
+              <a:ext uri="{FF2B5EF4-FFF2-40B4-BE49-F238E27FC236}">
+                <a16:creationId xmlns:a16="http://schemas.microsoft.com/office/drawing/2014/main" id="{F6D740AA-AF30-153C-0FF1-7689A68CFC15}"/>
+              </a:ext>
+            </a:extLst>
+          </p:cNvPr>
+          <p:cNvSpPr>
+            <a:spLocks noGrp="1"/>
+          </p:cNvSpPr>
+          <p:nvPr>
+            <p:ph type="ctrTitle"/>
+          </p:nvPr>
+        </p:nvSpPr>
+        <p:spPr/>
+        <p:txBody>
+          <a:bodyPr/>
+          <a:lstStyle/>
+          <a:p>
+            <a:r>
+              <a:rPr lang="en-US" dirty="0"/>
+              <a:t>Feature importance</a:t>
+            </a:r>
+          </a:p>
+        </p:txBody>
+      </p:sp>
+      <p:sp>
+        <p:nvSpPr>
+          <p:cNvPr id="3" name="Subtitle 2">
+            <a:extLst>
+              <a:ext uri="{FF2B5EF4-FFF2-40B4-BE49-F238E27FC236}">
+                <a16:creationId xmlns:a16="http://schemas.microsoft.com/office/drawing/2014/main" id="{81417E61-9830-3912-7274-773ABBEAA529}"/>
+              </a:ext>
+            </a:extLst>
+          </p:cNvPr>
+          <p:cNvSpPr>
+            <a:spLocks noGrp="1"/>
+          </p:cNvSpPr>
+          <p:nvPr>
+            <p:ph type="subTitle" idx="1"/>
+          </p:nvPr>
+        </p:nvSpPr>
+        <p:spPr/>
+        <p:txBody>
+          <a:bodyPr>
+            <a:normAutofit/>
+          </a:bodyPr>
+          <a:lstStyle/>
+          <a:p>
+            <a:r>
+              <a:rPr lang="en-US" dirty="0"/>
+              <a:t>Bram Droppers</a:t>
+            </a:r>
+          </a:p>
+        </p:txBody>
+      </p:sp>
+    </p:spTree>
+    <p:extLst>
+      <p:ext uri="{BB962C8B-B14F-4D97-AF65-F5344CB8AC3E}">
+        <p14:creationId xmlns:p14="http://schemas.microsoft.com/office/powerpoint/2010/main" val="3315299860"/>
       </p:ext>
     </p:extLst>
   </p:cSld>

</xml_diff>